<commit_message>
revised overall and experiment added
</commit_message>
<xml_diff>
--- a/figure/architecture.pptx
+++ b/figure/architecture.pptx
@@ -5,7 +5,9 @@
     <p:sldMasterId id="2147483648" r:id="rId1"/>
   </p:sldMasterIdLst>
   <p:sldIdLst>
-    <p:sldId id="257" r:id="rId2"/>
+    <p:sldId id="259" r:id="rId2"/>
+    <p:sldId id="258" r:id="rId3"/>
+    <p:sldId id="257" r:id="rId4"/>
   </p:sldIdLst>
   <p:sldSz cx="12192000" cy="6858000"/>
   <p:notesSz cx="6858000" cy="9144000"/>
@@ -243,7 +245,7 @@
           <a:p>
             <a:fld id="{B70B2DCB-62EA-4840-BAE6-806CF0F7CE28}" type="datetimeFigureOut">
               <a:rPr lang="ko-KR" altLang="en-US" smtClean="0"/>
-              <a:t>2018-03-08</a:t>
+              <a:t>2018-03-13</a:t>
             </a:fld>
             <a:endParaRPr lang="ko-KR" altLang="en-US"/>
           </a:p>
@@ -413,7 +415,7 @@
           <a:p>
             <a:fld id="{B70B2DCB-62EA-4840-BAE6-806CF0F7CE28}" type="datetimeFigureOut">
               <a:rPr lang="ko-KR" altLang="en-US" smtClean="0"/>
-              <a:t>2018-03-08</a:t>
+              <a:t>2018-03-13</a:t>
             </a:fld>
             <a:endParaRPr lang="ko-KR" altLang="en-US"/>
           </a:p>
@@ -593,7 +595,7 @@
           <a:p>
             <a:fld id="{B70B2DCB-62EA-4840-BAE6-806CF0F7CE28}" type="datetimeFigureOut">
               <a:rPr lang="ko-KR" altLang="en-US" smtClean="0"/>
-              <a:t>2018-03-08</a:t>
+              <a:t>2018-03-13</a:t>
             </a:fld>
             <a:endParaRPr lang="ko-KR" altLang="en-US"/>
           </a:p>
@@ -763,7 +765,7 @@
           <a:p>
             <a:fld id="{B70B2DCB-62EA-4840-BAE6-806CF0F7CE28}" type="datetimeFigureOut">
               <a:rPr lang="ko-KR" altLang="en-US" smtClean="0"/>
-              <a:t>2018-03-08</a:t>
+              <a:t>2018-03-13</a:t>
             </a:fld>
             <a:endParaRPr lang="ko-KR" altLang="en-US"/>
           </a:p>
@@ -1009,7 +1011,7 @@
           <a:p>
             <a:fld id="{B70B2DCB-62EA-4840-BAE6-806CF0F7CE28}" type="datetimeFigureOut">
               <a:rPr lang="ko-KR" altLang="en-US" smtClean="0"/>
-              <a:t>2018-03-08</a:t>
+              <a:t>2018-03-13</a:t>
             </a:fld>
             <a:endParaRPr lang="ko-KR" altLang="en-US"/>
           </a:p>
@@ -1241,7 +1243,7 @@
           <a:p>
             <a:fld id="{B70B2DCB-62EA-4840-BAE6-806CF0F7CE28}" type="datetimeFigureOut">
               <a:rPr lang="ko-KR" altLang="en-US" smtClean="0"/>
-              <a:t>2018-03-08</a:t>
+              <a:t>2018-03-13</a:t>
             </a:fld>
             <a:endParaRPr lang="ko-KR" altLang="en-US"/>
           </a:p>
@@ -1608,7 +1610,7 @@
           <a:p>
             <a:fld id="{B70B2DCB-62EA-4840-BAE6-806CF0F7CE28}" type="datetimeFigureOut">
               <a:rPr lang="ko-KR" altLang="en-US" smtClean="0"/>
-              <a:t>2018-03-08</a:t>
+              <a:t>2018-03-13</a:t>
             </a:fld>
             <a:endParaRPr lang="ko-KR" altLang="en-US"/>
           </a:p>
@@ -1726,7 +1728,7 @@
           <a:p>
             <a:fld id="{B70B2DCB-62EA-4840-BAE6-806CF0F7CE28}" type="datetimeFigureOut">
               <a:rPr lang="ko-KR" altLang="en-US" smtClean="0"/>
-              <a:t>2018-03-08</a:t>
+              <a:t>2018-03-13</a:t>
             </a:fld>
             <a:endParaRPr lang="ko-KR" altLang="en-US"/>
           </a:p>
@@ -1821,7 +1823,7 @@
           <a:p>
             <a:fld id="{B70B2DCB-62EA-4840-BAE6-806CF0F7CE28}" type="datetimeFigureOut">
               <a:rPr lang="ko-KR" altLang="en-US" smtClean="0"/>
-              <a:t>2018-03-08</a:t>
+              <a:t>2018-03-13</a:t>
             </a:fld>
             <a:endParaRPr lang="ko-KR" altLang="en-US"/>
           </a:p>
@@ -2098,7 +2100,7 @@
           <a:p>
             <a:fld id="{B70B2DCB-62EA-4840-BAE6-806CF0F7CE28}" type="datetimeFigureOut">
               <a:rPr lang="ko-KR" altLang="en-US" smtClean="0"/>
-              <a:t>2018-03-08</a:t>
+              <a:t>2018-03-13</a:t>
             </a:fld>
             <a:endParaRPr lang="ko-KR" altLang="en-US"/>
           </a:p>
@@ -2351,7 +2353,7 @@
           <a:p>
             <a:fld id="{B70B2DCB-62EA-4840-BAE6-806CF0F7CE28}" type="datetimeFigureOut">
               <a:rPr lang="ko-KR" altLang="en-US" smtClean="0"/>
-              <a:t>2018-03-08</a:t>
+              <a:t>2018-03-13</a:t>
             </a:fld>
             <a:endParaRPr lang="ko-KR" altLang="en-US"/>
           </a:p>
@@ -2564,7 +2566,7 @@
           <a:p>
             <a:fld id="{B70B2DCB-62EA-4840-BAE6-806CF0F7CE28}" type="datetimeFigureOut">
               <a:rPr lang="ko-KR" altLang="en-US" smtClean="0"/>
-              <a:t>2018-03-08</a:t>
+              <a:t>2018-03-13</a:t>
             </a:fld>
             <a:endParaRPr lang="ko-KR" altLang="en-US"/>
           </a:p>
@@ -2977,14 +2979,14 @@
         </p:nvSpPr>
         <p:spPr>
           <a:xfrm>
-            <a:off x="2185467" y="1981201"/>
+            <a:off x="2856671" y="1654841"/>
             <a:ext cx="1678076" cy="323849"/>
           </a:xfrm>
           <a:prstGeom prst="rect">
             <a:avLst/>
           </a:prstGeom>
           <a:noFill/>
-          <a:ln w="28575">
+          <a:ln w="19050">
             <a:solidFill>
               <a:schemeClr val="tx1"/>
             </a:solidFill>
@@ -3012,6 +3014,1413 @@
           <a:p>
             <a:pPr algn="ctr"/>
             <a:r>
+              <a:rPr lang="en-US" altLang="ko-KR" b="1" dirty="0" smtClean="0">
+                <a:solidFill>
+                  <a:schemeClr val="tx1"/>
+                </a:solidFill>
+                <a:latin typeface="Times New Roman" panose="02020603050405020304" pitchFamily="18" charset="0"/>
+                <a:cs typeface="Times New Roman" panose="02020603050405020304" pitchFamily="18" charset="0"/>
+              </a:rPr>
+              <a:t>PC Extractor</a:t>
+            </a:r>
+            <a:endParaRPr lang="ko-KR" altLang="en-US" b="1" dirty="0">
+              <a:solidFill>
+                <a:schemeClr val="tx1"/>
+              </a:solidFill>
+              <a:latin typeface="Times New Roman" panose="02020603050405020304" pitchFamily="18" charset="0"/>
+              <a:cs typeface="Times New Roman" panose="02020603050405020304" pitchFamily="18" charset="0"/>
+            </a:endParaRPr>
+          </a:p>
+        </p:txBody>
+      </p:sp>
+      <p:sp>
+        <p:nvSpPr>
+          <p:cNvPr id="6" name="직사각형 5"/>
+          <p:cNvSpPr/>
+          <p:nvPr/>
+        </p:nvSpPr>
+        <p:spPr>
+          <a:xfrm>
+            <a:off x="2474331" y="2537001"/>
+            <a:ext cx="2432546" cy="322596"/>
+          </a:xfrm>
+          <a:prstGeom prst="rect">
+            <a:avLst/>
+          </a:prstGeom>
+          <a:noFill/>
+          <a:ln w="19050">
+            <a:solidFill>
+              <a:schemeClr val="tx1"/>
+            </a:solidFill>
+          </a:ln>
+        </p:spPr>
+        <p:style>
+          <a:lnRef idx="2">
+            <a:schemeClr val="accent1">
+              <a:shade val="50000"/>
+            </a:schemeClr>
+          </a:lnRef>
+          <a:fillRef idx="1">
+            <a:schemeClr val="accent1"/>
+          </a:fillRef>
+          <a:effectRef idx="0">
+            <a:schemeClr val="accent1"/>
+          </a:effectRef>
+          <a:fontRef idx="minor">
+            <a:schemeClr val="lt1"/>
+          </a:fontRef>
+        </p:style>
+        <p:txBody>
+          <a:bodyPr tIns="0" bIns="0" rtlCol="0" anchor="t"/>
+          <a:lstStyle/>
+          <a:p>
+            <a:pPr algn="ctr"/>
+            <a:r>
+              <a:rPr lang="en-US" altLang="ko-KR" b="1" dirty="0" smtClean="0">
+                <a:solidFill>
+                  <a:schemeClr val="tx1"/>
+                </a:solidFill>
+                <a:latin typeface="Times New Roman" panose="02020603050405020304" pitchFamily="18" charset="0"/>
+                <a:cs typeface="Times New Roman" panose="02020603050405020304" pitchFamily="18" charset="0"/>
+              </a:rPr>
+              <a:t>PC-Lifetime Analyzer</a:t>
+            </a:r>
+            <a:endParaRPr lang="ko-KR" altLang="en-US" b="1" dirty="0">
+              <a:solidFill>
+                <a:schemeClr val="tx1"/>
+              </a:solidFill>
+              <a:latin typeface="Times New Roman" panose="02020603050405020304" pitchFamily="18" charset="0"/>
+              <a:cs typeface="Times New Roman" panose="02020603050405020304" pitchFamily="18" charset="0"/>
+            </a:endParaRPr>
+          </a:p>
+        </p:txBody>
+      </p:sp>
+      <p:cxnSp>
+        <p:nvCxnSpPr>
+          <p:cNvPr id="8" name="직선 연결선 7"/>
+          <p:cNvCxnSpPr/>
+          <p:nvPr/>
+        </p:nvCxnSpPr>
+        <p:spPr>
+          <a:xfrm>
+            <a:off x="2159404" y="1409700"/>
+            <a:ext cx="3069509" cy="0"/>
+          </a:xfrm>
+          <a:prstGeom prst="line">
+            <a:avLst/>
+          </a:prstGeom>
+          <a:ln w="44450">
+            <a:solidFill>
+              <a:schemeClr val="tx1"/>
+            </a:solidFill>
+          </a:ln>
+        </p:spPr>
+        <p:style>
+          <a:lnRef idx="1">
+            <a:schemeClr val="accent1"/>
+          </a:lnRef>
+          <a:fillRef idx="0">
+            <a:schemeClr val="accent1"/>
+          </a:fillRef>
+          <a:effectRef idx="0">
+            <a:schemeClr val="accent1"/>
+          </a:effectRef>
+          <a:fontRef idx="minor">
+            <a:schemeClr val="tx1"/>
+          </a:fontRef>
+        </p:style>
+      </p:cxnSp>
+      <p:cxnSp>
+        <p:nvCxnSpPr>
+          <p:cNvPr id="10" name="직선 화살표 연결선 9"/>
+          <p:cNvCxnSpPr>
+            <a:stCxn id="2" idx="0"/>
+            <a:endCxn id="4" idx="0"/>
+          </p:cNvCxnSpPr>
+          <p:nvPr/>
+        </p:nvCxnSpPr>
+        <p:spPr>
+          <a:xfrm>
+            <a:off x="3694159" y="1465325"/>
+            <a:ext cx="1550" cy="189516"/>
+          </a:xfrm>
+          <a:prstGeom prst="straightConnector1">
+            <a:avLst/>
+          </a:prstGeom>
+          <a:ln w="19050">
+            <a:solidFill>
+              <a:schemeClr val="tx1"/>
+            </a:solidFill>
+            <a:prstDash val="sysDash"/>
+            <a:tailEnd type="triangle" w="lg" len="med"/>
+          </a:ln>
+        </p:spPr>
+        <p:style>
+          <a:lnRef idx="1">
+            <a:schemeClr val="accent1"/>
+          </a:lnRef>
+          <a:fillRef idx="0">
+            <a:schemeClr val="accent1"/>
+          </a:fillRef>
+          <a:effectRef idx="0">
+            <a:schemeClr val="accent1"/>
+          </a:effectRef>
+          <a:fontRef idx="minor">
+            <a:schemeClr val="tx1"/>
+          </a:fontRef>
+        </p:style>
+      </p:cxnSp>
+      <p:cxnSp>
+        <p:nvCxnSpPr>
+          <p:cNvPr id="22" name="직선 화살표 연결선 21"/>
+          <p:cNvCxnSpPr>
+            <a:stCxn id="4" idx="2"/>
+            <a:endCxn id="50" idx="0"/>
+          </p:cNvCxnSpPr>
+          <p:nvPr/>
+        </p:nvCxnSpPr>
+        <p:spPr>
+          <a:xfrm flipH="1">
+            <a:off x="3691764" y="1978690"/>
+            <a:ext cx="3945" cy="155252"/>
+          </a:xfrm>
+          <a:prstGeom prst="straightConnector1">
+            <a:avLst/>
+          </a:prstGeom>
+          <a:ln w="19050">
+            <a:solidFill>
+              <a:schemeClr val="tx1"/>
+            </a:solidFill>
+            <a:prstDash val="sysDash"/>
+            <a:tailEnd type="triangle" w="lg" len="med"/>
+          </a:ln>
+        </p:spPr>
+        <p:style>
+          <a:lnRef idx="1">
+            <a:schemeClr val="accent1"/>
+          </a:lnRef>
+          <a:fillRef idx="0">
+            <a:schemeClr val="accent1"/>
+          </a:fillRef>
+          <a:effectRef idx="0">
+            <a:schemeClr val="accent1"/>
+          </a:effectRef>
+          <a:fontRef idx="minor">
+            <a:schemeClr val="tx1"/>
+          </a:fontRef>
+        </p:style>
+      </p:cxnSp>
+      <p:sp>
+        <p:nvSpPr>
+          <p:cNvPr id="31" name="TextBox 30"/>
+          <p:cNvSpPr txBox="1"/>
+          <p:nvPr/>
+        </p:nvSpPr>
+        <p:spPr>
+          <a:xfrm>
+            <a:off x="4262059" y="2190015"/>
+            <a:ext cx="662361" cy="400110"/>
+          </a:xfrm>
+          <a:prstGeom prst="rect">
+            <a:avLst/>
+          </a:prstGeom>
+          <a:noFill/>
+        </p:spPr>
+        <p:txBody>
+          <a:bodyPr wrap="none" rtlCol="0">
+            <a:spAutoFit/>
+          </a:bodyPr>
+          <a:lstStyle/>
+          <a:p>
+            <a:pPr algn="r"/>
+            <a:r>
+              <a:rPr lang="en-US" altLang="ko-KR" sz="1000" dirty="0" smtClean="0">
+                <a:latin typeface="Times New Roman" panose="02020603050405020304" pitchFamily="18" charset="0"/>
+                <a:cs typeface="Times New Roman" panose="02020603050405020304" pitchFamily="18" charset="0"/>
+              </a:rPr>
+              <a:t>Trimmed</a:t>
+            </a:r>
+          </a:p>
+          <a:p>
+            <a:pPr algn="r"/>
+            <a:r>
+              <a:rPr lang="en-US" altLang="ko-KR" sz="1000" dirty="0" smtClean="0">
+                <a:latin typeface="Times New Roman" panose="02020603050405020304" pitchFamily="18" charset="0"/>
+                <a:cs typeface="Times New Roman" panose="02020603050405020304" pitchFamily="18" charset="0"/>
+              </a:rPr>
+              <a:t>LBA</a:t>
+            </a:r>
+            <a:endParaRPr lang="ko-KR" altLang="en-US" sz="1000" dirty="0">
+              <a:latin typeface="Times New Roman" panose="02020603050405020304" pitchFamily="18" charset="0"/>
+              <a:cs typeface="Times New Roman" panose="02020603050405020304" pitchFamily="18" charset="0"/>
+            </a:endParaRPr>
+          </a:p>
+        </p:txBody>
+      </p:sp>
+      <p:sp>
+        <p:nvSpPr>
+          <p:cNvPr id="32" name="TextBox 31"/>
+          <p:cNvSpPr txBox="1"/>
+          <p:nvPr/>
+        </p:nvSpPr>
+        <p:spPr>
+          <a:xfrm>
+            <a:off x="2942751" y="1924146"/>
+            <a:ext cx="729687" cy="261610"/>
+          </a:xfrm>
+          <a:prstGeom prst="rect">
+            <a:avLst/>
+          </a:prstGeom>
+          <a:noFill/>
+        </p:spPr>
+        <p:txBody>
+          <a:bodyPr wrap="none" rtlCol="0">
+            <a:spAutoFit/>
+          </a:bodyPr>
+          <a:lstStyle/>
+          <a:p>
+            <a:r>
+              <a:rPr lang="en-US" altLang="ko-KR" sz="1100" b="1" dirty="0" smtClean="0">
+                <a:latin typeface="Times New Roman" panose="02020603050405020304" pitchFamily="18" charset="0"/>
+                <a:cs typeface="Times New Roman" panose="02020603050405020304" pitchFamily="18" charset="0"/>
+              </a:rPr>
+              <a:t>PC value</a:t>
+            </a:r>
+            <a:endParaRPr lang="ko-KR" altLang="en-US" sz="1100" b="1" dirty="0">
+              <a:latin typeface="Times New Roman" panose="02020603050405020304" pitchFamily="18" charset="0"/>
+              <a:cs typeface="Times New Roman" panose="02020603050405020304" pitchFamily="18" charset="0"/>
+            </a:endParaRPr>
+          </a:p>
+        </p:txBody>
+      </p:sp>
+      <p:sp>
+        <p:nvSpPr>
+          <p:cNvPr id="33" name="아래쪽 화살표 32"/>
+          <p:cNvSpPr/>
+          <p:nvPr/>
+        </p:nvSpPr>
+        <p:spPr>
+          <a:xfrm>
+            <a:off x="3587777" y="1130974"/>
+            <a:ext cx="218509" cy="244754"/>
+          </a:xfrm>
+          <a:prstGeom prst="downArrow">
+            <a:avLst>
+              <a:gd name="adj1" fmla="val 50000"/>
+              <a:gd name="adj2" fmla="val 32564"/>
+            </a:avLst>
+          </a:prstGeom>
+          <a:solidFill>
+            <a:schemeClr val="bg1"/>
+          </a:solidFill>
+          <a:ln>
+            <a:solidFill>
+              <a:schemeClr val="tx1"/>
+            </a:solidFill>
+          </a:ln>
+        </p:spPr>
+        <p:style>
+          <a:lnRef idx="2">
+            <a:schemeClr val="accent1">
+              <a:shade val="50000"/>
+            </a:schemeClr>
+          </a:lnRef>
+          <a:fillRef idx="1">
+            <a:schemeClr val="accent1"/>
+          </a:fillRef>
+          <a:effectRef idx="0">
+            <a:schemeClr val="accent1"/>
+          </a:effectRef>
+          <a:fontRef idx="minor">
+            <a:schemeClr val="lt1"/>
+          </a:fontRef>
+        </p:style>
+        <p:txBody>
+          <a:bodyPr rtlCol="0" anchor="ctr"/>
+          <a:lstStyle/>
+          <a:p>
+            <a:pPr algn="ctr"/>
+            <a:endParaRPr lang="ko-KR" altLang="en-US"/>
+          </a:p>
+        </p:txBody>
+      </p:sp>
+      <p:sp>
+        <p:nvSpPr>
+          <p:cNvPr id="34" name="TextBox 33"/>
+          <p:cNvSpPr txBox="1"/>
+          <p:nvPr/>
+        </p:nvSpPr>
+        <p:spPr>
+          <a:xfrm>
+            <a:off x="3384698" y="842501"/>
+            <a:ext cx="646139" cy="338554"/>
+          </a:xfrm>
+          <a:prstGeom prst="rect">
+            <a:avLst/>
+          </a:prstGeom>
+          <a:noFill/>
+        </p:spPr>
+        <p:txBody>
+          <a:bodyPr wrap="none" rtlCol="0">
+            <a:spAutoFit/>
+          </a:bodyPr>
+          <a:lstStyle/>
+          <a:p>
+            <a:r>
+              <a:rPr lang="en-US" altLang="ko-KR" sz="1600" dirty="0" smtClean="0">
+                <a:latin typeface="Times New Roman" panose="02020603050405020304" pitchFamily="18" charset="0"/>
+                <a:cs typeface="Times New Roman" panose="02020603050405020304" pitchFamily="18" charset="0"/>
+              </a:rPr>
+              <a:t>Write</a:t>
+            </a:r>
+            <a:endParaRPr lang="ko-KR" altLang="en-US" sz="1600" dirty="0">
+              <a:latin typeface="Times New Roman" panose="02020603050405020304" pitchFamily="18" charset="0"/>
+              <a:cs typeface="Times New Roman" panose="02020603050405020304" pitchFamily="18" charset="0"/>
+            </a:endParaRPr>
+          </a:p>
+        </p:txBody>
+      </p:sp>
+      <p:sp>
+        <p:nvSpPr>
+          <p:cNvPr id="36" name="TextBox 35"/>
+          <p:cNvSpPr txBox="1"/>
+          <p:nvPr/>
+        </p:nvSpPr>
+        <p:spPr>
+          <a:xfrm>
+            <a:off x="4507241" y="836855"/>
+            <a:ext cx="721672" cy="338554"/>
+          </a:xfrm>
+          <a:prstGeom prst="rect">
+            <a:avLst/>
+          </a:prstGeom>
+          <a:noFill/>
+        </p:spPr>
+        <p:txBody>
+          <a:bodyPr wrap="none" rtlCol="0">
+            <a:spAutoFit/>
+          </a:bodyPr>
+          <a:lstStyle/>
+          <a:p>
+            <a:r>
+              <a:rPr lang="en-US" altLang="ko-KR" sz="1600" dirty="0" smtClean="0">
+                <a:latin typeface="Times New Roman" panose="02020603050405020304" pitchFamily="18" charset="0"/>
+                <a:cs typeface="Times New Roman" panose="02020603050405020304" pitchFamily="18" charset="0"/>
+              </a:rPr>
+              <a:t>Delete</a:t>
+            </a:r>
+            <a:endParaRPr lang="ko-KR" altLang="en-US" sz="1600" dirty="0">
+              <a:latin typeface="Times New Roman" panose="02020603050405020304" pitchFamily="18" charset="0"/>
+              <a:cs typeface="Times New Roman" panose="02020603050405020304" pitchFamily="18" charset="0"/>
+            </a:endParaRPr>
+          </a:p>
+        </p:txBody>
+      </p:sp>
+      <p:sp>
+        <p:nvSpPr>
+          <p:cNvPr id="37" name="TextBox 36"/>
+          <p:cNvSpPr txBox="1"/>
+          <p:nvPr/>
+        </p:nvSpPr>
+        <p:spPr>
+          <a:xfrm>
+            <a:off x="2138207" y="1412889"/>
+            <a:ext cx="790601" cy="338554"/>
+          </a:xfrm>
+          <a:prstGeom prst="rect">
+            <a:avLst/>
+          </a:prstGeom>
+          <a:noFill/>
+        </p:spPr>
+        <p:txBody>
+          <a:bodyPr wrap="none" rtlCol="0">
+            <a:spAutoFit/>
+          </a:bodyPr>
+          <a:lstStyle/>
+          <a:p>
+            <a:r>
+              <a:rPr lang="en-US" altLang="ko-KR" sz="1600" b="1" dirty="0" smtClean="0">
+                <a:latin typeface="Times New Roman" panose="02020603050405020304" pitchFamily="18" charset="0"/>
+                <a:cs typeface="Times New Roman" panose="02020603050405020304" pitchFamily="18" charset="0"/>
+              </a:rPr>
+              <a:t>Kernel</a:t>
+            </a:r>
+          </a:p>
+        </p:txBody>
+      </p:sp>
+      <p:sp>
+        <p:nvSpPr>
+          <p:cNvPr id="38" name="TextBox 37"/>
+          <p:cNvSpPr txBox="1"/>
+          <p:nvPr/>
+        </p:nvSpPr>
+        <p:spPr>
+          <a:xfrm>
+            <a:off x="2138215" y="1045390"/>
+            <a:ext cx="1212191" cy="338554"/>
+          </a:xfrm>
+          <a:prstGeom prst="rect">
+            <a:avLst/>
+          </a:prstGeom>
+          <a:noFill/>
+        </p:spPr>
+        <p:txBody>
+          <a:bodyPr wrap="none" rtlCol="0">
+            <a:spAutoFit/>
+          </a:bodyPr>
+          <a:lstStyle/>
+          <a:p>
+            <a:r>
+              <a:rPr lang="en-US" altLang="ko-KR" sz="1600" b="1" dirty="0" smtClean="0">
+                <a:latin typeface="Times New Roman" panose="02020603050405020304" pitchFamily="18" charset="0"/>
+                <a:cs typeface="Times New Roman" panose="02020603050405020304" pitchFamily="18" charset="0"/>
+              </a:rPr>
+              <a:t>Application</a:t>
+            </a:r>
+          </a:p>
+        </p:txBody>
+      </p:sp>
+      <p:sp>
+        <p:nvSpPr>
+          <p:cNvPr id="44" name="직사각형 43"/>
+          <p:cNvSpPr/>
+          <p:nvPr/>
+        </p:nvSpPr>
+        <p:spPr>
+          <a:xfrm>
+            <a:off x="2380236" y="3081122"/>
+            <a:ext cx="2623076" cy="695324"/>
+          </a:xfrm>
+          <a:prstGeom prst="rect">
+            <a:avLst/>
+          </a:prstGeom>
+          <a:noFill/>
+          <a:ln w="19050">
+            <a:solidFill>
+              <a:schemeClr val="tx1"/>
+            </a:solidFill>
+          </a:ln>
+        </p:spPr>
+        <p:style>
+          <a:lnRef idx="2">
+            <a:schemeClr val="accent1">
+              <a:shade val="50000"/>
+            </a:schemeClr>
+          </a:lnRef>
+          <a:fillRef idx="1">
+            <a:schemeClr val="accent1"/>
+          </a:fillRef>
+          <a:effectRef idx="0">
+            <a:schemeClr val="accent1"/>
+          </a:effectRef>
+          <a:fontRef idx="minor">
+            <a:schemeClr val="lt1"/>
+          </a:fontRef>
+        </p:style>
+        <p:txBody>
+          <a:bodyPr rtlCol="0" anchor="t"/>
+          <a:lstStyle/>
+          <a:p>
+            <a:pPr algn="ctr"/>
+            <a:r>
+              <a:rPr lang="en-US" altLang="ko-KR" b="1" dirty="0" smtClean="0">
+                <a:solidFill>
+                  <a:schemeClr val="tx1"/>
+                </a:solidFill>
+                <a:latin typeface="Times New Roman" panose="02020603050405020304" pitchFamily="18" charset="0"/>
+                <a:cs typeface="Times New Roman" panose="02020603050405020304" pitchFamily="18" charset="0"/>
+              </a:rPr>
+              <a:t>PC-to-Stream Mapper</a:t>
+            </a:r>
+            <a:endParaRPr lang="ko-KR" altLang="en-US" b="1" dirty="0">
+              <a:solidFill>
+                <a:schemeClr val="tx1"/>
+              </a:solidFill>
+              <a:latin typeface="Times New Roman" panose="02020603050405020304" pitchFamily="18" charset="0"/>
+              <a:cs typeface="Times New Roman" panose="02020603050405020304" pitchFamily="18" charset="0"/>
+            </a:endParaRPr>
+          </a:p>
+        </p:txBody>
+      </p:sp>
+      <p:cxnSp>
+        <p:nvCxnSpPr>
+          <p:cNvPr id="46" name="직선 화살표 연결선 45"/>
+          <p:cNvCxnSpPr>
+            <a:stCxn id="6" idx="2"/>
+            <a:endCxn id="44" idx="0"/>
+          </p:cNvCxnSpPr>
+          <p:nvPr/>
+        </p:nvCxnSpPr>
+        <p:spPr>
+          <a:xfrm>
+            <a:off x="3690604" y="2859597"/>
+            <a:ext cx="1170" cy="221525"/>
+          </a:xfrm>
+          <a:prstGeom prst="straightConnector1">
+            <a:avLst/>
+          </a:prstGeom>
+          <a:ln w="19050">
+            <a:solidFill>
+              <a:schemeClr val="tx1"/>
+            </a:solidFill>
+            <a:prstDash val="sysDash"/>
+            <a:tailEnd type="triangle" w="lg" len="med"/>
+          </a:ln>
+        </p:spPr>
+        <p:style>
+          <a:lnRef idx="1">
+            <a:schemeClr val="accent1"/>
+          </a:lnRef>
+          <a:fillRef idx="0">
+            <a:schemeClr val="accent1"/>
+          </a:fillRef>
+          <a:effectRef idx="0">
+            <a:schemeClr val="accent1"/>
+          </a:effectRef>
+          <a:fontRef idx="minor">
+            <a:schemeClr val="tx1"/>
+          </a:fontRef>
+        </p:style>
+      </p:cxnSp>
+      <p:sp>
+        <p:nvSpPr>
+          <p:cNvPr id="49" name="TextBox 48"/>
+          <p:cNvSpPr txBox="1"/>
+          <p:nvPr/>
+        </p:nvSpPr>
+        <p:spPr>
+          <a:xfrm>
+            <a:off x="3705936" y="2843974"/>
+            <a:ext cx="933269" cy="246221"/>
+          </a:xfrm>
+          <a:prstGeom prst="rect">
+            <a:avLst/>
+          </a:prstGeom>
+          <a:noFill/>
+        </p:spPr>
+        <p:txBody>
+          <a:bodyPr wrap="none" rtlCol="0">
+            <a:spAutoFit/>
+          </a:bodyPr>
+          <a:lstStyle/>
+          <a:p>
+            <a:r>
+              <a:rPr lang="en-US" altLang="ko-KR" sz="1000" dirty="0" smtClean="0">
+                <a:latin typeface="Times New Roman" panose="02020603050405020304" pitchFamily="18" charset="0"/>
+                <a:cs typeface="Times New Roman" panose="02020603050405020304" pitchFamily="18" charset="0"/>
+              </a:rPr>
+              <a:t>(PC, Lifetime)</a:t>
+            </a:r>
+            <a:endParaRPr lang="ko-KR" altLang="en-US" sz="1000" dirty="0">
+              <a:latin typeface="Times New Roman" panose="02020603050405020304" pitchFamily="18" charset="0"/>
+              <a:cs typeface="Times New Roman" panose="02020603050405020304" pitchFamily="18" charset="0"/>
+            </a:endParaRPr>
+          </a:p>
+        </p:txBody>
+      </p:sp>
+      <p:sp>
+        <p:nvSpPr>
+          <p:cNvPr id="52" name="모서리가 둥근 직사각형 51"/>
+          <p:cNvSpPr/>
+          <p:nvPr/>
+        </p:nvSpPr>
+        <p:spPr>
+          <a:xfrm>
+            <a:off x="3820790" y="3457281"/>
+            <a:ext cx="1103630" cy="236571"/>
+          </a:xfrm>
+          <a:prstGeom prst="roundRect">
+            <a:avLst/>
+          </a:prstGeom>
+          <a:solidFill>
+            <a:schemeClr val="bg1">
+              <a:lumMod val="85000"/>
+            </a:schemeClr>
+          </a:solidFill>
+          <a:ln>
+            <a:solidFill>
+              <a:schemeClr val="tx1"/>
+            </a:solidFill>
+          </a:ln>
+        </p:spPr>
+        <p:style>
+          <a:lnRef idx="2">
+            <a:schemeClr val="accent1">
+              <a:shade val="50000"/>
+            </a:schemeClr>
+          </a:lnRef>
+          <a:fillRef idx="1">
+            <a:schemeClr val="accent1"/>
+          </a:fillRef>
+          <a:effectRef idx="0">
+            <a:schemeClr val="accent1"/>
+          </a:effectRef>
+          <a:fontRef idx="minor">
+            <a:schemeClr val="lt1"/>
+          </a:fontRef>
+        </p:style>
+        <p:txBody>
+          <a:bodyPr lIns="0" rIns="0" rtlCol="0" anchor="ctr"/>
+          <a:lstStyle/>
+          <a:p>
+            <a:pPr algn="ctr"/>
+            <a:r>
+              <a:rPr lang="en-US" altLang="ko-KR" sz="1200" dirty="0" smtClean="0">
+                <a:solidFill>
+                  <a:schemeClr val="tx1"/>
+                </a:solidFill>
+                <a:latin typeface="Times New Roman" panose="02020603050405020304" pitchFamily="18" charset="0"/>
+                <a:cs typeface="Times New Roman" panose="02020603050405020304" pitchFamily="18" charset="0"/>
+              </a:rPr>
+              <a:t>Mapping Policy</a:t>
+            </a:r>
+            <a:endParaRPr lang="ko-KR" altLang="en-US" sz="1200" dirty="0">
+              <a:solidFill>
+                <a:schemeClr val="tx1"/>
+              </a:solidFill>
+              <a:latin typeface="Times New Roman" panose="02020603050405020304" pitchFamily="18" charset="0"/>
+              <a:cs typeface="Times New Roman" panose="02020603050405020304" pitchFamily="18" charset="0"/>
+            </a:endParaRPr>
+          </a:p>
+        </p:txBody>
+      </p:sp>
+      <p:sp>
+        <p:nvSpPr>
+          <p:cNvPr id="56" name="모서리가 둥근 직사각형 55"/>
+          <p:cNvSpPr/>
+          <p:nvPr/>
+        </p:nvSpPr>
+        <p:spPr>
+          <a:xfrm>
+            <a:off x="2574098" y="3451158"/>
+            <a:ext cx="1103630" cy="236571"/>
+          </a:xfrm>
+          <a:prstGeom prst="roundRect">
+            <a:avLst/>
+          </a:prstGeom>
+          <a:solidFill>
+            <a:schemeClr val="bg1">
+              <a:lumMod val="85000"/>
+            </a:schemeClr>
+          </a:solidFill>
+          <a:ln>
+            <a:solidFill>
+              <a:schemeClr val="tx1"/>
+            </a:solidFill>
+          </a:ln>
+        </p:spPr>
+        <p:style>
+          <a:lnRef idx="2">
+            <a:schemeClr val="accent1">
+              <a:shade val="50000"/>
+            </a:schemeClr>
+          </a:lnRef>
+          <a:fillRef idx="1">
+            <a:schemeClr val="accent1"/>
+          </a:fillRef>
+          <a:effectRef idx="0">
+            <a:schemeClr val="accent1"/>
+          </a:effectRef>
+          <a:fontRef idx="minor">
+            <a:schemeClr val="lt1"/>
+          </a:fontRef>
+        </p:style>
+        <p:txBody>
+          <a:bodyPr rtlCol="0" anchor="ctr"/>
+          <a:lstStyle/>
+          <a:p>
+            <a:pPr algn="ctr"/>
+            <a:r>
+              <a:rPr lang="en-US" altLang="ko-KR" sz="1200" dirty="0" smtClean="0">
+                <a:solidFill>
+                  <a:schemeClr val="tx1"/>
+                </a:solidFill>
+                <a:latin typeface="Times New Roman" panose="02020603050405020304" pitchFamily="18" charset="0"/>
+                <a:cs typeface="Times New Roman" panose="02020603050405020304" pitchFamily="18" charset="0"/>
+              </a:rPr>
+              <a:t>PC Clustering</a:t>
+            </a:r>
+            <a:endParaRPr lang="ko-KR" altLang="en-US" sz="1200" dirty="0">
+              <a:solidFill>
+                <a:schemeClr val="tx1"/>
+              </a:solidFill>
+              <a:latin typeface="Times New Roman" panose="02020603050405020304" pitchFamily="18" charset="0"/>
+              <a:cs typeface="Times New Roman" panose="02020603050405020304" pitchFamily="18" charset="0"/>
+            </a:endParaRPr>
+          </a:p>
+        </p:txBody>
+      </p:sp>
+      <p:sp>
+        <p:nvSpPr>
+          <p:cNvPr id="60" name="TextBox 59"/>
+          <p:cNvSpPr txBox="1"/>
+          <p:nvPr/>
+        </p:nvSpPr>
+        <p:spPr>
+          <a:xfrm>
+            <a:off x="2478284" y="3828539"/>
+            <a:ext cx="1136850" cy="246221"/>
+          </a:xfrm>
+          <a:prstGeom prst="rect">
+            <a:avLst/>
+          </a:prstGeom>
+          <a:noFill/>
+        </p:spPr>
+        <p:txBody>
+          <a:bodyPr wrap="none" rtlCol="0">
+            <a:spAutoFit/>
+          </a:bodyPr>
+          <a:lstStyle/>
+          <a:p>
+            <a:r>
+              <a:rPr lang="en-US" altLang="ko-KR" sz="1000" dirty="0" smtClean="0">
+                <a:latin typeface="Times New Roman" panose="02020603050405020304" pitchFamily="18" charset="0"/>
+                <a:cs typeface="Times New Roman" panose="02020603050405020304" pitchFamily="18" charset="0"/>
+              </a:rPr>
+              <a:t>Total # of Streams</a:t>
+            </a:r>
+            <a:endParaRPr lang="ko-KR" altLang="en-US" sz="1000" dirty="0">
+              <a:latin typeface="Times New Roman" panose="02020603050405020304" pitchFamily="18" charset="0"/>
+              <a:cs typeface="Times New Roman" panose="02020603050405020304" pitchFamily="18" charset="0"/>
+            </a:endParaRPr>
+          </a:p>
+        </p:txBody>
+      </p:sp>
+      <p:sp>
+        <p:nvSpPr>
+          <p:cNvPr id="61" name="TextBox 60"/>
+          <p:cNvSpPr txBox="1"/>
+          <p:nvPr/>
+        </p:nvSpPr>
+        <p:spPr>
+          <a:xfrm>
+            <a:off x="2887992" y="4148899"/>
+            <a:ext cx="1721946" cy="338554"/>
+          </a:xfrm>
+          <a:prstGeom prst="rect">
+            <a:avLst/>
+          </a:prstGeom>
+          <a:noFill/>
+        </p:spPr>
+        <p:txBody>
+          <a:bodyPr wrap="none" rtlCol="0">
+            <a:spAutoFit/>
+          </a:bodyPr>
+          <a:lstStyle/>
+          <a:p>
+            <a:r>
+              <a:rPr lang="en-US" altLang="ko-KR" sz="1600" dirty="0" smtClean="0">
+                <a:latin typeface="Times New Roman" panose="02020603050405020304" pitchFamily="18" charset="0"/>
+                <a:cs typeface="Times New Roman" panose="02020603050405020304" pitchFamily="18" charset="0"/>
+              </a:rPr>
+              <a:t>Multi-Stream SSD</a:t>
+            </a:r>
+          </a:p>
+        </p:txBody>
+      </p:sp>
+      <p:cxnSp>
+        <p:nvCxnSpPr>
+          <p:cNvPr id="63" name="직선 화살표 연결선 62"/>
+          <p:cNvCxnSpPr>
+            <a:stCxn id="44" idx="2"/>
+          </p:cNvCxnSpPr>
+          <p:nvPr/>
+        </p:nvCxnSpPr>
+        <p:spPr>
+          <a:xfrm flipH="1">
+            <a:off x="3690604" y="3776446"/>
+            <a:ext cx="1170" cy="267949"/>
+          </a:xfrm>
+          <a:prstGeom prst="straightConnector1">
+            <a:avLst/>
+          </a:prstGeom>
+          <a:ln w="19050">
+            <a:solidFill>
+              <a:schemeClr val="tx1"/>
+            </a:solidFill>
+            <a:prstDash val="sysDash"/>
+            <a:tailEnd type="triangle" w="lg" len="med"/>
+          </a:ln>
+        </p:spPr>
+        <p:style>
+          <a:lnRef idx="1">
+            <a:schemeClr val="accent1"/>
+          </a:lnRef>
+          <a:fillRef idx="0">
+            <a:schemeClr val="accent1"/>
+          </a:fillRef>
+          <a:effectRef idx="0">
+            <a:schemeClr val="accent1"/>
+          </a:effectRef>
+          <a:fontRef idx="minor">
+            <a:schemeClr val="tx1"/>
+          </a:fontRef>
+        </p:style>
+      </p:cxnSp>
+      <p:sp>
+        <p:nvSpPr>
+          <p:cNvPr id="69" name="TextBox 68"/>
+          <p:cNvSpPr txBox="1"/>
+          <p:nvPr/>
+        </p:nvSpPr>
+        <p:spPr>
+          <a:xfrm>
+            <a:off x="3687665" y="3786053"/>
+            <a:ext cx="1871474" cy="276999"/>
+          </a:xfrm>
+          <a:prstGeom prst="rect">
+            <a:avLst/>
+          </a:prstGeom>
+          <a:noFill/>
+        </p:spPr>
+        <p:txBody>
+          <a:bodyPr wrap="none" rtlCol="0">
+            <a:spAutoFit/>
+          </a:bodyPr>
+          <a:lstStyle/>
+          <a:p>
+            <a:r>
+              <a:rPr lang="en-US" altLang="ko-KR" sz="1000" dirty="0" smtClean="0">
+                <a:latin typeface="Times New Roman" panose="02020603050405020304" pitchFamily="18" charset="0"/>
+                <a:cs typeface="Times New Roman" panose="02020603050405020304" pitchFamily="18" charset="0"/>
+              </a:rPr>
+              <a:t>Write </a:t>
+            </a:r>
+            <a:r>
+              <a:rPr lang="en-US" altLang="ko-KR" sz="1200" dirty="0" smtClean="0">
+                <a:latin typeface="Times New Roman" panose="02020603050405020304" pitchFamily="18" charset="0"/>
+                <a:cs typeface="Times New Roman" panose="02020603050405020304" pitchFamily="18" charset="0"/>
+              </a:rPr>
+              <a:t>(</a:t>
+            </a:r>
+            <a:r>
+              <a:rPr lang="en-US" altLang="ko-KR" sz="1200" b="1" dirty="0" err="1" smtClean="0">
+                <a:latin typeface="Times New Roman" panose="02020603050405020304" pitchFamily="18" charset="0"/>
+                <a:cs typeface="Times New Roman" panose="02020603050405020304" pitchFamily="18" charset="0"/>
+              </a:rPr>
+              <a:t>StreamID</a:t>
+            </a:r>
+            <a:r>
+              <a:rPr lang="en-US" altLang="ko-KR" sz="1000" b="1" dirty="0" smtClean="0">
+                <a:latin typeface="Times New Roman" panose="02020603050405020304" pitchFamily="18" charset="0"/>
+                <a:cs typeface="Times New Roman" panose="02020603050405020304" pitchFamily="18" charset="0"/>
+              </a:rPr>
+              <a:t>,</a:t>
+            </a:r>
+            <a:r>
+              <a:rPr lang="en-US" altLang="ko-KR" sz="1200" b="1" dirty="0" smtClean="0">
+                <a:latin typeface="Times New Roman" panose="02020603050405020304" pitchFamily="18" charset="0"/>
+                <a:cs typeface="Times New Roman" panose="02020603050405020304" pitchFamily="18" charset="0"/>
+              </a:rPr>
+              <a:t> </a:t>
+            </a:r>
+            <a:r>
+              <a:rPr lang="en-US" altLang="ko-KR" sz="1000" dirty="0" smtClean="0">
+                <a:latin typeface="Times New Roman" panose="02020603050405020304" pitchFamily="18" charset="0"/>
+                <a:cs typeface="Times New Roman" panose="02020603050405020304" pitchFamily="18" charset="0"/>
+              </a:rPr>
+              <a:t>LBA, Size</a:t>
+            </a:r>
+            <a:r>
+              <a:rPr lang="en-US" altLang="ko-KR" sz="1200" dirty="0" smtClean="0">
+                <a:latin typeface="Times New Roman" panose="02020603050405020304" pitchFamily="18" charset="0"/>
+                <a:cs typeface="Times New Roman" panose="02020603050405020304" pitchFamily="18" charset="0"/>
+              </a:rPr>
+              <a:t>)</a:t>
+            </a:r>
+            <a:endParaRPr lang="ko-KR" altLang="en-US" sz="1200" b="1" dirty="0">
+              <a:latin typeface="Times New Roman" panose="02020603050405020304" pitchFamily="18" charset="0"/>
+              <a:cs typeface="Times New Roman" panose="02020603050405020304" pitchFamily="18" charset="0"/>
+            </a:endParaRPr>
+          </a:p>
+        </p:txBody>
+      </p:sp>
+      <p:sp>
+        <p:nvSpPr>
+          <p:cNvPr id="39" name="아래쪽 화살표 38"/>
+          <p:cNvSpPr/>
+          <p:nvPr/>
+        </p:nvSpPr>
+        <p:spPr>
+          <a:xfrm>
+            <a:off x="4755110" y="1125511"/>
+            <a:ext cx="218509" cy="244754"/>
+          </a:xfrm>
+          <a:prstGeom prst="downArrow">
+            <a:avLst>
+              <a:gd name="adj1" fmla="val 50000"/>
+              <a:gd name="adj2" fmla="val 32564"/>
+            </a:avLst>
+          </a:prstGeom>
+          <a:solidFill>
+            <a:schemeClr val="bg1"/>
+          </a:solidFill>
+          <a:ln>
+            <a:solidFill>
+              <a:schemeClr val="tx1"/>
+            </a:solidFill>
+          </a:ln>
+        </p:spPr>
+        <p:style>
+          <a:lnRef idx="2">
+            <a:schemeClr val="accent1">
+              <a:shade val="50000"/>
+            </a:schemeClr>
+          </a:lnRef>
+          <a:fillRef idx="1">
+            <a:schemeClr val="accent1"/>
+          </a:fillRef>
+          <a:effectRef idx="0">
+            <a:schemeClr val="accent1"/>
+          </a:effectRef>
+          <a:fontRef idx="minor">
+            <a:schemeClr val="lt1"/>
+          </a:fontRef>
+        </p:style>
+        <p:txBody>
+          <a:bodyPr rtlCol="0" anchor="ctr"/>
+          <a:lstStyle/>
+          <a:p>
+            <a:pPr algn="ctr"/>
+            <a:endParaRPr lang="ko-KR" altLang="en-US"/>
+          </a:p>
+        </p:txBody>
+      </p:sp>
+      <p:sp>
+        <p:nvSpPr>
+          <p:cNvPr id="2" name="직사각형 1"/>
+          <p:cNvSpPr/>
+          <p:nvPr/>
+        </p:nvSpPr>
+        <p:spPr>
+          <a:xfrm>
+            <a:off x="2159404" y="1465325"/>
+            <a:ext cx="3069509" cy="2363214"/>
+          </a:xfrm>
+          <a:prstGeom prst="rect">
+            <a:avLst/>
+          </a:prstGeom>
+          <a:noFill/>
+          <a:ln>
+            <a:solidFill>
+              <a:schemeClr val="tx1"/>
+            </a:solidFill>
+          </a:ln>
+        </p:spPr>
+        <p:style>
+          <a:lnRef idx="2">
+            <a:schemeClr val="accent1">
+              <a:shade val="50000"/>
+            </a:schemeClr>
+          </a:lnRef>
+          <a:fillRef idx="1">
+            <a:schemeClr val="accent1"/>
+          </a:fillRef>
+          <a:effectRef idx="0">
+            <a:schemeClr val="accent1"/>
+          </a:effectRef>
+          <a:fontRef idx="minor">
+            <a:schemeClr val="lt1"/>
+          </a:fontRef>
+        </p:style>
+        <p:txBody>
+          <a:bodyPr rtlCol="0" anchor="ctr"/>
+          <a:lstStyle/>
+          <a:p>
+            <a:pPr algn="ctr"/>
+            <a:endParaRPr lang="ko-KR" altLang="en-US"/>
+          </a:p>
+        </p:txBody>
+      </p:sp>
+      <p:sp>
+        <p:nvSpPr>
+          <p:cNvPr id="40" name="직사각형 39"/>
+          <p:cNvSpPr/>
+          <p:nvPr/>
+        </p:nvSpPr>
+        <p:spPr>
+          <a:xfrm>
+            <a:off x="2159404" y="4144262"/>
+            <a:ext cx="3069510" cy="328393"/>
+          </a:xfrm>
+          <a:prstGeom prst="rect">
+            <a:avLst/>
+          </a:prstGeom>
+          <a:noFill/>
+          <a:ln>
+            <a:solidFill>
+              <a:schemeClr val="tx1"/>
+            </a:solidFill>
+          </a:ln>
+        </p:spPr>
+        <p:style>
+          <a:lnRef idx="2">
+            <a:schemeClr val="accent1">
+              <a:shade val="50000"/>
+            </a:schemeClr>
+          </a:lnRef>
+          <a:fillRef idx="1">
+            <a:schemeClr val="accent1"/>
+          </a:fillRef>
+          <a:effectRef idx="0">
+            <a:schemeClr val="accent1"/>
+          </a:effectRef>
+          <a:fontRef idx="minor">
+            <a:schemeClr val="lt1"/>
+          </a:fontRef>
+        </p:style>
+        <p:txBody>
+          <a:bodyPr rtlCol="0" anchor="ctr"/>
+          <a:lstStyle/>
+          <a:p>
+            <a:pPr algn="ctr"/>
+            <a:endParaRPr lang="ko-KR" altLang="en-US"/>
+          </a:p>
+        </p:txBody>
+      </p:sp>
+      <p:cxnSp>
+        <p:nvCxnSpPr>
+          <p:cNvPr id="41" name="직선 연결선 40"/>
+          <p:cNvCxnSpPr/>
+          <p:nvPr/>
+        </p:nvCxnSpPr>
+        <p:spPr>
+          <a:xfrm>
+            <a:off x="2159404" y="4073142"/>
+            <a:ext cx="3069509" cy="0"/>
+          </a:xfrm>
+          <a:prstGeom prst="line">
+            <a:avLst/>
+          </a:prstGeom>
+          <a:ln w="44450">
+            <a:solidFill>
+              <a:schemeClr val="tx1"/>
+            </a:solidFill>
+          </a:ln>
+        </p:spPr>
+        <p:style>
+          <a:lnRef idx="1">
+            <a:schemeClr val="accent1"/>
+          </a:lnRef>
+          <a:fillRef idx="0">
+            <a:schemeClr val="accent1"/>
+          </a:fillRef>
+          <a:effectRef idx="0">
+            <a:schemeClr val="accent1"/>
+          </a:effectRef>
+          <a:fontRef idx="minor">
+            <a:schemeClr val="tx1"/>
+          </a:fontRef>
+        </p:style>
+      </p:cxnSp>
+      <p:cxnSp>
+        <p:nvCxnSpPr>
+          <p:cNvPr id="7" name="직선 연결선 6"/>
+          <p:cNvCxnSpPr/>
+          <p:nvPr/>
+        </p:nvCxnSpPr>
+        <p:spPr>
+          <a:xfrm>
+            <a:off x="2159404" y="2251044"/>
+            <a:ext cx="3069509" cy="0"/>
+          </a:xfrm>
+          <a:prstGeom prst="line">
+            <a:avLst/>
+          </a:prstGeom>
+          <a:ln>
+            <a:solidFill>
+              <a:schemeClr val="tx1"/>
+            </a:solidFill>
+          </a:ln>
+        </p:spPr>
+        <p:style>
+          <a:lnRef idx="1">
+            <a:schemeClr val="accent1"/>
+          </a:lnRef>
+          <a:fillRef idx="0">
+            <a:schemeClr val="accent1"/>
+          </a:fillRef>
+          <a:effectRef idx="0">
+            <a:schemeClr val="accent1"/>
+          </a:effectRef>
+          <a:fontRef idx="minor">
+            <a:schemeClr val="tx1"/>
+          </a:fontRef>
+        </p:style>
+      </p:cxnSp>
+      <p:sp>
+        <p:nvSpPr>
+          <p:cNvPr id="50" name="모서리가 둥근 직사각형 49"/>
+          <p:cNvSpPr/>
+          <p:nvPr/>
+        </p:nvSpPr>
+        <p:spPr>
+          <a:xfrm>
+            <a:off x="3233681" y="2133942"/>
+            <a:ext cx="916166" cy="244408"/>
+          </a:xfrm>
+          <a:prstGeom prst="roundRect">
+            <a:avLst/>
+          </a:prstGeom>
+          <a:solidFill>
+            <a:schemeClr val="bg1"/>
+          </a:solidFill>
+          <a:ln>
+            <a:solidFill>
+              <a:schemeClr val="tx1"/>
+            </a:solidFill>
+          </a:ln>
+        </p:spPr>
+        <p:style>
+          <a:lnRef idx="2">
+            <a:schemeClr val="accent1">
+              <a:shade val="50000"/>
+            </a:schemeClr>
+          </a:lnRef>
+          <a:fillRef idx="1">
+            <a:schemeClr val="accent1"/>
+          </a:fillRef>
+          <a:effectRef idx="0">
+            <a:schemeClr val="accent1"/>
+          </a:effectRef>
+          <a:fontRef idx="minor">
+            <a:schemeClr val="lt1"/>
+          </a:fontRef>
+        </p:style>
+        <p:txBody>
+          <a:bodyPr rtlCol="0" anchor="ctr"/>
+          <a:lstStyle/>
+          <a:p>
+            <a:pPr algn="ctr"/>
+            <a:r>
+              <a:rPr lang="en-US" altLang="ko-KR" sz="1200" dirty="0" err="1" smtClean="0">
+                <a:solidFill>
+                  <a:schemeClr val="tx1"/>
+                </a:solidFill>
+                <a:latin typeface="Times New Roman" panose="02020603050405020304" pitchFamily="18" charset="0"/>
+                <a:cs typeface="Times New Roman" panose="02020603050405020304" pitchFamily="18" charset="0"/>
+              </a:rPr>
+              <a:t>Inode</a:t>
+            </a:r>
+            <a:r>
+              <a:rPr lang="en-US" altLang="ko-KR" sz="1200" dirty="0" smtClean="0">
+                <a:solidFill>
+                  <a:schemeClr val="tx1"/>
+                </a:solidFill>
+                <a:latin typeface="+mj-lt"/>
+                <a:cs typeface="Times New Roman" panose="02020603050405020304" pitchFamily="18" charset="0"/>
+              </a:rPr>
+              <a:t>-&gt;</a:t>
+            </a:r>
+            <a:r>
+              <a:rPr lang="en-US" altLang="ko-KR" sz="1200" dirty="0" smtClean="0">
+                <a:solidFill>
+                  <a:schemeClr val="tx1"/>
+                </a:solidFill>
+                <a:latin typeface="Times New Roman" panose="02020603050405020304" pitchFamily="18" charset="0"/>
+                <a:cs typeface="Times New Roman" panose="02020603050405020304" pitchFamily="18" charset="0"/>
+              </a:rPr>
+              <a:t>pc</a:t>
+            </a:r>
+            <a:endParaRPr lang="ko-KR" altLang="en-US" sz="1200" dirty="0">
+              <a:solidFill>
+                <a:schemeClr val="tx1"/>
+              </a:solidFill>
+              <a:latin typeface="Times New Roman" panose="02020603050405020304" pitchFamily="18" charset="0"/>
+              <a:cs typeface="Times New Roman" panose="02020603050405020304" pitchFamily="18" charset="0"/>
+            </a:endParaRPr>
+          </a:p>
+        </p:txBody>
+      </p:sp>
+      <p:cxnSp>
+        <p:nvCxnSpPr>
+          <p:cNvPr id="53" name="직선 화살표 연결선 52"/>
+          <p:cNvCxnSpPr>
+            <a:stCxn id="50" idx="2"/>
+            <a:endCxn id="6" idx="0"/>
+          </p:cNvCxnSpPr>
+          <p:nvPr/>
+        </p:nvCxnSpPr>
+        <p:spPr>
+          <a:xfrm flipH="1">
+            <a:off x="3690604" y="2378350"/>
+            <a:ext cx="1160" cy="158651"/>
+          </a:xfrm>
+          <a:prstGeom prst="straightConnector1">
+            <a:avLst/>
+          </a:prstGeom>
+          <a:ln w="6350">
+            <a:solidFill>
+              <a:schemeClr val="tx1"/>
+            </a:solidFill>
+            <a:prstDash val="sysDash"/>
+            <a:tailEnd type="triangle" w="sm" len="sm"/>
+          </a:ln>
+        </p:spPr>
+        <p:style>
+          <a:lnRef idx="1">
+            <a:schemeClr val="accent1"/>
+          </a:lnRef>
+          <a:fillRef idx="0">
+            <a:schemeClr val="accent1"/>
+          </a:fillRef>
+          <a:effectRef idx="0">
+            <a:schemeClr val="accent1"/>
+          </a:effectRef>
+          <a:fontRef idx="minor">
+            <a:schemeClr val="tx1"/>
+          </a:fontRef>
+        </p:style>
+      </p:cxnSp>
+      <p:cxnSp>
+        <p:nvCxnSpPr>
+          <p:cNvPr id="43" name="직선 화살표 연결선 42"/>
+          <p:cNvCxnSpPr>
+            <a:stCxn id="39" idx="2"/>
+          </p:cNvCxnSpPr>
+          <p:nvPr/>
+        </p:nvCxnSpPr>
+        <p:spPr>
+          <a:xfrm>
+            <a:off x="4864365" y="1370265"/>
+            <a:ext cx="0" cy="1166736"/>
+          </a:xfrm>
+          <a:prstGeom prst="straightConnector1">
+            <a:avLst/>
+          </a:prstGeom>
+          <a:ln w="6350">
+            <a:solidFill>
+              <a:schemeClr val="tx1"/>
+            </a:solidFill>
+            <a:prstDash val="sysDash"/>
+            <a:tailEnd type="triangle" w="sm" len="sm"/>
+          </a:ln>
+        </p:spPr>
+        <p:style>
+          <a:lnRef idx="1">
+            <a:schemeClr val="accent1"/>
+          </a:lnRef>
+          <a:fillRef idx="0">
+            <a:schemeClr val="accent1"/>
+          </a:fillRef>
+          <a:effectRef idx="0">
+            <a:schemeClr val="accent1"/>
+          </a:effectRef>
+          <a:fontRef idx="minor">
+            <a:schemeClr val="tx1"/>
+          </a:fontRef>
+        </p:style>
+      </p:cxnSp>
+      <p:cxnSp>
+        <p:nvCxnSpPr>
+          <p:cNvPr id="51" name="직선 화살표 연결선 50"/>
+          <p:cNvCxnSpPr/>
+          <p:nvPr/>
+        </p:nvCxnSpPr>
+        <p:spPr>
+          <a:xfrm flipV="1">
+            <a:off x="2523113" y="3767004"/>
+            <a:ext cx="523" cy="306138"/>
+          </a:xfrm>
+          <a:prstGeom prst="straightConnector1">
+            <a:avLst/>
+          </a:prstGeom>
+          <a:ln w="19050">
+            <a:solidFill>
+              <a:schemeClr val="tx1"/>
+            </a:solidFill>
+            <a:prstDash val="sysDash"/>
+            <a:tailEnd type="triangle" w="lg" len="med"/>
+          </a:ln>
+        </p:spPr>
+        <p:style>
+          <a:lnRef idx="1">
+            <a:schemeClr val="accent1"/>
+          </a:lnRef>
+          <a:fillRef idx="0">
+            <a:schemeClr val="accent1"/>
+          </a:fillRef>
+          <a:effectRef idx="0">
+            <a:schemeClr val="accent1"/>
+          </a:effectRef>
+          <a:fontRef idx="minor">
+            <a:schemeClr val="tx1"/>
+          </a:fontRef>
+        </p:style>
+      </p:cxnSp>
+    </p:spTree>
+    <p:extLst>
+      <p:ext uri="{BB962C8B-B14F-4D97-AF65-F5344CB8AC3E}">
+        <p14:creationId xmlns:p14="http://schemas.microsoft.com/office/powerpoint/2010/main" val="1722332894"/>
+      </p:ext>
+    </p:extLst>
+  </p:cSld>
+  <p:clrMapOvr>
+    <a:masterClrMapping/>
+  </p:clrMapOvr>
+</p:sld>
+</file>
+
+<file path=ppt/slides/slide2.xml><?xml version="1.0" encoding="utf-8"?>
+<p:sld xmlns:a="http://schemas.openxmlformats.org/drawingml/2006/main" xmlns:r="http://schemas.openxmlformats.org/officeDocument/2006/relationships" xmlns:p="http://schemas.openxmlformats.org/presentationml/2006/main">
+  <p:cSld>
+    <p:spTree>
+      <p:nvGrpSpPr>
+        <p:cNvPr id="1" name=""/>
+        <p:cNvGrpSpPr/>
+        <p:nvPr/>
+      </p:nvGrpSpPr>
+      <p:grpSpPr>
+        <a:xfrm>
+          <a:off x="0" y="0"/>
+          <a:ext cx="0" cy="0"/>
+          <a:chOff x="0" y="0"/>
+          <a:chExt cx="0" cy="0"/>
+        </a:xfrm>
+      </p:grpSpPr>
+      <p:sp>
+        <p:nvSpPr>
+          <p:cNvPr id="4" name="직사각형 3"/>
+          <p:cNvSpPr/>
+          <p:nvPr/>
+        </p:nvSpPr>
+        <p:spPr>
+          <a:xfrm>
+            <a:off x="2185467" y="1981201"/>
+            <a:ext cx="1678076" cy="323849"/>
+          </a:xfrm>
+          <a:prstGeom prst="rect">
+            <a:avLst/>
+          </a:prstGeom>
+          <a:noFill/>
+          <a:ln w="19050">
+            <a:solidFill>
+              <a:schemeClr val="tx1"/>
+            </a:solidFill>
+          </a:ln>
+        </p:spPr>
+        <p:style>
+          <a:lnRef idx="2">
+            <a:schemeClr val="accent1">
+              <a:shade val="50000"/>
+            </a:schemeClr>
+          </a:lnRef>
+          <a:fillRef idx="1">
+            <a:schemeClr val="accent1"/>
+          </a:fillRef>
+          <a:effectRef idx="0">
+            <a:schemeClr val="accent1"/>
+          </a:effectRef>
+          <a:fontRef idx="minor">
+            <a:schemeClr val="lt1"/>
+          </a:fontRef>
+        </p:style>
+        <p:txBody>
+          <a:bodyPr rtlCol="0" anchor="ctr"/>
+          <a:lstStyle/>
+          <a:p>
+            <a:pPr algn="ctr"/>
+            <a:r>
               <a:rPr lang="en-US" altLang="ko-KR" dirty="0" smtClean="0">
                 <a:solidFill>
                   <a:schemeClr val="tx1"/>
@@ -3046,7 +4455,7 @@
             <a:avLst/>
           </a:prstGeom>
           <a:noFill/>
-          <a:ln w="28575">
+          <a:ln w="19050">
             <a:solidFill>
               <a:schemeClr val="tx1"/>
             </a:solidFill>
@@ -3108,7 +4517,7 @@
             <a:avLst/>
           </a:prstGeom>
           <a:noFill/>
-          <a:ln w="28575">
+          <a:ln w="19050">
             <a:solidFill>
               <a:schemeClr val="tx1"/>
             </a:solidFill>
@@ -3163,13 +4572,13 @@
         </p:nvCxnSpPr>
         <p:spPr>
           <a:xfrm>
-            <a:off x="1432157" y="1160780"/>
+            <a:off x="1432157" y="1054100"/>
             <a:ext cx="4549543" cy="0"/>
           </a:xfrm>
           <a:prstGeom prst="line">
             <a:avLst/>
           </a:prstGeom>
-          <a:ln w="25400">
+          <a:ln w="44450">
             <a:solidFill>
               <a:schemeClr val="tx1"/>
             </a:solidFill>
@@ -3201,8 +4610,8 @@
         </p:nvCxnSpPr>
         <p:spPr>
           <a:xfrm>
-            <a:off x="3024505" y="1492249"/>
-            <a:ext cx="0" cy="488952"/>
+            <a:off x="3024505" y="1387581"/>
+            <a:ext cx="0" cy="593620"/>
           </a:xfrm>
           <a:prstGeom prst="straightConnector1">
             <a:avLst/>
@@ -3238,14 +4647,14 @@
         </p:nvSpPr>
         <p:spPr>
           <a:xfrm>
-            <a:off x="2331085" y="1168400"/>
-            <a:ext cx="1386840" cy="323849"/>
+            <a:off x="2331085" y="1166387"/>
+            <a:ext cx="1386840" cy="221194"/>
           </a:xfrm>
           <a:prstGeom prst="rect">
             <a:avLst/>
           </a:prstGeom>
           <a:noFill/>
-          <a:ln w="28575">
+          <a:ln w="19050">
             <a:solidFill>
               <a:schemeClr val="tx1"/>
             </a:solidFill>
@@ -3300,14 +4709,14 @@
         </p:nvSpPr>
         <p:spPr>
           <a:xfrm>
-            <a:off x="4338075" y="1168399"/>
-            <a:ext cx="1386840" cy="323849"/>
+            <a:off x="4338075" y="1166386"/>
+            <a:ext cx="1386840" cy="221194"/>
           </a:xfrm>
           <a:prstGeom prst="rect">
             <a:avLst/>
           </a:prstGeom>
           <a:noFill/>
-          <a:ln w="28575">
+          <a:ln w="19050">
             <a:solidFill>
               <a:schemeClr val="tx1"/>
             </a:solidFill>
@@ -3365,8 +4774,8 @@
         </p:nvCxnSpPr>
         <p:spPr>
           <a:xfrm>
-            <a:off x="3024505" y="1492249"/>
-            <a:ext cx="2006752" cy="488951"/>
+            <a:off x="3024505" y="1387581"/>
+            <a:ext cx="2006752" cy="593619"/>
           </a:xfrm>
           <a:prstGeom prst="straightConnector1">
             <a:avLst/>
@@ -3405,8 +4814,8 @@
         </p:nvCxnSpPr>
         <p:spPr>
           <a:xfrm flipH="1">
-            <a:off x="5031257" y="1492248"/>
-            <a:ext cx="238" cy="488952"/>
+            <a:off x="5031257" y="1387580"/>
+            <a:ext cx="238" cy="593620"/>
           </a:xfrm>
           <a:prstGeom prst="straightConnector1">
             <a:avLst/>
@@ -3675,7 +5084,7 @@
         </p:nvSpPr>
         <p:spPr>
           <a:xfrm>
-            <a:off x="2897313" y="912534"/>
+            <a:off x="2897313" y="775374"/>
             <a:ext cx="218509" cy="244754"/>
           </a:xfrm>
           <a:prstGeom prst="downArrow">
@@ -3726,7 +5135,7 @@
         </p:nvSpPr>
         <p:spPr>
           <a:xfrm>
-            <a:off x="2689154" y="624061"/>
+            <a:off x="2689154" y="486901"/>
             <a:ext cx="646139" cy="338554"/>
           </a:xfrm>
           <a:prstGeom prst="rect">
@@ -3762,7 +5171,7 @@
         </p:nvSpPr>
         <p:spPr>
           <a:xfrm>
-            <a:off x="4617671" y="624061"/>
+            <a:off x="4617671" y="486901"/>
             <a:ext cx="721672" cy="338554"/>
           </a:xfrm>
           <a:prstGeom prst="rect">
@@ -3798,7 +5207,7 @@
         </p:nvSpPr>
         <p:spPr>
           <a:xfrm>
-            <a:off x="1432157" y="1141109"/>
+            <a:off x="1432157" y="1057289"/>
             <a:ext cx="790601" cy="338554"/>
           </a:xfrm>
           <a:prstGeom prst="rect">
@@ -3830,7 +5239,7 @@
         </p:nvSpPr>
         <p:spPr>
           <a:xfrm>
-            <a:off x="1432157" y="826950"/>
+            <a:off x="1432157" y="689790"/>
             <a:ext cx="1212191" cy="338554"/>
           </a:xfrm>
           <a:prstGeom prst="rect">
@@ -3869,7 +5278,7 @@
             <a:avLst/>
           </a:prstGeom>
           <a:noFill/>
-          <a:ln w="28575">
+          <a:ln w="19050">
             <a:solidFill>
               <a:schemeClr val="tx1"/>
             </a:solidFill>
@@ -4103,41 +5512,6 @@
           </a:p>
         </p:txBody>
       </p:sp>
-      <p:cxnSp>
-        <p:nvCxnSpPr>
-          <p:cNvPr id="55" name="직선 연결선 54"/>
-          <p:cNvCxnSpPr/>
-          <p:nvPr/>
-        </p:nvCxnSpPr>
-        <p:spPr>
-          <a:xfrm>
-            <a:off x="1432156" y="4599305"/>
-            <a:ext cx="4549543" cy="0"/>
-          </a:xfrm>
-          <a:prstGeom prst="line">
-            <a:avLst/>
-          </a:prstGeom>
-          <a:ln w="25400">
-            <a:solidFill>
-              <a:schemeClr val="tx1"/>
-            </a:solidFill>
-          </a:ln>
-        </p:spPr>
-        <p:style>
-          <a:lnRef idx="1">
-            <a:schemeClr val="accent1"/>
-          </a:lnRef>
-          <a:fillRef idx="0">
-            <a:schemeClr val="accent1"/>
-          </a:fillRef>
-          <a:effectRef idx="0">
-            <a:schemeClr val="accent1"/>
-          </a:effectRef>
-          <a:fontRef idx="minor">
-            <a:schemeClr val="tx1"/>
-          </a:fontRef>
-        </p:style>
-      </p:cxnSp>
       <p:sp>
         <p:nvSpPr>
           <p:cNvPr id="56" name="모서리가 둥근 직사각형 55"/>
@@ -4212,11 +5586,13 @@
         </p:nvCxnSpPr>
         <p:spPr>
           <a:xfrm rot="5400000" flipH="1" flipV="1">
-            <a:off x="2091444" y="3977975"/>
-            <a:ext cx="692784" cy="556862"/>
-          </a:xfrm>
-          <a:prstGeom prst="bentConnector2">
-            <a:avLst/>
+            <a:off x="2087792" y="3981627"/>
+            <a:ext cx="700088" cy="556862"/>
+          </a:xfrm>
+          <a:prstGeom prst="bentConnector3">
+            <a:avLst>
+              <a:gd name="adj1" fmla="val 100068"/>
+            </a:avLst>
           </a:prstGeom>
           <a:ln w="19050">
             <a:solidFill>
@@ -4294,7 +5670,7 @@
         </p:nvSpPr>
         <p:spPr>
           <a:xfrm>
-            <a:off x="1453368" y="4562716"/>
+            <a:off x="2934292" y="4702619"/>
             <a:ext cx="1807995" cy="338554"/>
           </a:xfrm>
           <a:prstGeom prst="rect">
@@ -4328,8 +5704,8 @@
         </p:nvCxnSpPr>
         <p:spPr>
           <a:xfrm flipH="1">
-            <a:off x="4026694" y="4257676"/>
-            <a:ext cx="1111" cy="338137"/>
+            <a:off x="4027527" y="4257676"/>
+            <a:ext cx="278" cy="352426"/>
           </a:xfrm>
           <a:prstGeom prst="straightConnector1">
             <a:avLst/>
@@ -4366,7 +5742,7 @@
         <p:spPr>
           <a:xfrm>
             <a:off x="4030804" y="4292673"/>
-            <a:ext cx="2634247" cy="307777"/>
+            <a:ext cx="2480359" cy="307777"/>
           </a:xfrm>
           <a:prstGeom prst="rect">
             <a:avLst/>
@@ -4419,21 +5795,1674 @@
                 <a:latin typeface="Times New Roman" panose="02020603050405020304" pitchFamily="18" charset="0"/>
                 <a:cs typeface="Times New Roman" panose="02020603050405020304" pitchFamily="18" charset="0"/>
               </a:rPr>
-              <a:t>LBA, </a:t>
-            </a:r>
+              <a:t>LBA, Size)</a:t>
+            </a:r>
+            <a:endParaRPr lang="ko-KR" altLang="en-US" sz="1200" b="1" dirty="0">
+              <a:latin typeface="Times New Roman" panose="02020603050405020304" pitchFamily="18" charset="0"/>
+              <a:cs typeface="Times New Roman" panose="02020603050405020304" pitchFamily="18" charset="0"/>
+            </a:endParaRPr>
+          </a:p>
+        </p:txBody>
+      </p:sp>
+      <p:sp>
+        <p:nvSpPr>
+          <p:cNvPr id="39" name="아래쪽 화살표 38"/>
+          <p:cNvSpPr/>
+          <p:nvPr/>
+        </p:nvSpPr>
+        <p:spPr>
+          <a:xfrm>
+            <a:off x="4918880" y="775557"/>
+            <a:ext cx="218509" cy="244754"/>
+          </a:xfrm>
+          <a:prstGeom prst="downArrow">
+            <a:avLst>
+              <a:gd name="adj1" fmla="val 50000"/>
+              <a:gd name="adj2" fmla="val 32564"/>
+            </a:avLst>
+          </a:prstGeom>
+          <a:solidFill>
+            <a:schemeClr val="bg1"/>
+          </a:solidFill>
+          <a:ln>
+            <a:solidFill>
+              <a:schemeClr val="tx1"/>
+            </a:solidFill>
+          </a:ln>
+        </p:spPr>
+        <p:style>
+          <a:lnRef idx="2">
+            <a:schemeClr val="accent1">
+              <a:shade val="50000"/>
+            </a:schemeClr>
+          </a:lnRef>
+          <a:fillRef idx="1">
+            <a:schemeClr val="accent1"/>
+          </a:fillRef>
+          <a:effectRef idx="0">
+            <a:schemeClr val="accent1"/>
+          </a:effectRef>
+          <a:fontRef idx="minor">
+            <a:schemeClr val="lt1"/>
+          </a:fontRef>
+        </p:style>
+        <p:txBody>
+          <a:bodyPr rtlCol="0" anchor="ctr"/>
+          <a:lstStyle/>
+          <a:p>
+            <a:pPr algn="ctr"/>
+            <a:endParaRPr lang="ko-KR" altLang="en-US"/>
+          </a:p>
+        </p:txBody>
+      </p:sp>
+      <p:sp>
+        <p:nvSpPr>
+          <p:cNvPr id="2" name="직사각형 1"/>
+          <p:cNvSpPr/>
+          <p:nvPr/>
+        </p:nvSpPr>
+        <p:spPr>
+          <a:xfrm>
+            <a:off x="1453368" y="1116346"/>
+            <a:ext cx="4490232" cy="3227054"/>
+          </a:xfrm>
+          <a:prstGeom prst="rect">
+            <a:avLst/>
+          </a:prstGeom>
+          <a:noFill/>
+          <a:ln>
+            <a:solidFill>
+              <a:schemeClr val="tx1"/>
+            </a:solidFill>
+          </a:ln>
+        </p:spPr>
+        <p:style>
+          <a:lnRef idx="2">
+            <a:schemeClr val="accent1">
+              <a:shade val="50000"/>
+            </a:schemeClr>
+          </a:lnRef>
+          <a:fillRef idx="1">
+            <a:schemeClr val="accent1"/>
+          </a:fillRef>
+          <a:effectRef idx="0">
+            <a:schemeClr val="accent1"/>
+          </a:effectRef>
+          <a:fontRef idx="minor">
+            <a:schemeClr val="lt1"/>
+          </a:fontRef>
+        </p:style>
+        <p:txBody>
+          <a:bodyPr rtlCol="0" anchor="ctr"/>
+          <a:lstStyle/>
+          <a:p>
+            <a:pPr algn="ctr"/>
+            <a:endParaRPr lang="ko-KR" altLang="en-US"/>
+          </a:p>
+        </p:txBody>
+      </p:sp>
+      <p:sp>
+        <p:nvSpPr>
+          <p:cNvPr id="40" name="직사각형 39"/>
+          <p:cNvSpPr/>
+          <p:nvPr/>
+        </p:nvSpPr>
+        <p:spPr>
+          <a:xfrm>
+            <a:off x="1453368" y="4697982"/>
+            <a:ext cx="4490232" cy="328393"/>
+          </a:xfrm>
+          <a:prstGeom prst="rect">
+            <a:avLst/>
+          </a:prstGeom>
+          <a:noFill/>
+          <a:ln>
+            <a:solidFill>
+              <a:schemeClr val="tx1"/>
+            </a:solidFill>
+          </a:ln>
+        </p:spPr>
+        <p:style>
+          <a:lnRef idx="2">
+            <a:schemeClr val="accent1">
+              <a:shade val="50000"/>
+            </a:schemeClr>
+          </a:lnRef>
+          <a:fillRef idx="1">
+            <a:schemeClr val="accent1"/>
+          </a:fillRef>
+          <a:effectRef idx="0">
+            <a:schemeClr val="accent1"/>
+          </a:effectRef>
+          <a:fontRef idx="minor">
+            <a:schemeClr val="lt1"/>
+          </a:fontRef>
+        </p:style>
+        <p:txBody>
+          <a:bodyPr rtlCol="0" anchor="ctr"/>
+          <a:lstStyle/>
+          <a:p>
+            <a:pPr algn="ctr"/>
+            <a:endParaRPr lang="ko-KR" altLang="en-US"/>
+          </a:p>
+        </p:txBody>
+      </p:sp>
+      <p:cxnSp>
+        <p:nvCxnSpPr>
+          <p:cNvPr id="41" name="직선 연결선 40"/>
+          <p:cNvCxnSpPr/>
+          <p:nvPr/>
+        </p:nvCxnSpPr>
+        <p:spPr>
+          <a:xfrm>
+            <a:off x="1443153" y="4626862"/>
+            <a:ext cx="4549543" cy="0"/>
+          </a:xfrm>
+          <a:prstGeom prst="line">
+            <a:avLst/>
+          </a:prstGeom>
+          <a:ln w="44450">
+            <a:solidFill>
+              <a:schemeClr val="tx1"/>
+            </a:solidFill>
+          </a:ln>
+        </p:spPr>
+        <p:style>
+          <a:lnRef idx="1">
+            <a:schemeClr val="accent1"/>
+          </a:lnRef>
+          <a:fillRef idx="0">
+            <a:schemeClr val="accent1"/>
+          </a:fillRef>
+          <a:effectRef idx="0">
+            <a:schemeClr val="accent1"/>
+          </a:effectRef>
+          <a:fontRef idx="minor">
+            <a:schemeClr val="tx1"/>
+          </a:fontRef>
+        </p:style>
+      </p:cxnSp>
+    </p:spTree>
+    <p:extLst>
+      <p:ext uri="{BB962C8B-B14F-4D97-AF65-F5344CB8AC3E}">
+        <p14:creationId xmlns:p14="http://schemas.microsoft.com/office/powerpoint/2010/main" val="1457825051"/>
+      </p:ext>
+    </p:extLst>
+  </p:cSld>
+  <p:clrMapOvr>
+    <a:masterClrMapping/>
+  </p:clrMapOvr>
+</p:sld>
+</file>
+
+<file path=ppt/slides/slide3.xml><?xml version="1.0" encoding="utf-8"?>
+<p:sld xmlns:a="http://schemas.openxmlformats.org/drawingml/2006/main" xmlns:r="http://schemas.openxmlformats.org/officeDocument/2006/relationships" xmlns:p="http://schemas.openxmlformats.org/presentationml/2006/main">
+  <p:cSld>
+    <p:spTree>
+      <p:nvGrpSpPr>
+        <p:cNvPr id="1" name=""/>
+        <p:cNvGrpSpPr/>
+        <p:nvPr/>
+      </p:nvGrpSpPr>
+      <p:grpSpPr>
+        <a:xfrm>
+          <a:off x="0" y="0"/>
+          <a:ext cx="0" cy="0"/>
+          <a:chOff x="0" y="0"/>
+          <a:chExt cx="0" cy="0"/>
+        </a:xfrm>
+      </p:grpSpPr>
+      <p:sp>
+        <p:nvSpPr>
+          <p:cNvPr id="4" name="직사각형 3"/>
+          <p:cNvSpPr/>
+          <p:nvPr/>
+        </p:nvSpPr>
+        <p:spPr>
+          <a:xfrm>
+            <a:off x="2185467" y="1981201"/>
+            <a:ext cx="1678076" cy="323849"/>
+          </a:xfrm>
+          <a:prstGeom prst="rect">
+            <a:avLst/>
+          </a:prstGeom>
+          <a:noFill/>
+          <a:ln w="28575">
+            <a:solidFill>
+              <a:schemeClr val="tx1"/>
+            </a:solidFill>
+          </a:ln>
+        </p:spPr>
+        <p:style>
+          <a:lnRef idx="2">
+            <a:schemeClr val="accent1">
+              <a:shade val="50000"/>
+            </a:schemeClr>
+          </a:lnRef>
+          <a:fillRef idx="1">
+            <a:schemeClr val="accent1"/>
+          </a:fillRef>
+          <a:effectRef idx="0">
+            <a:schemeClr val="accent1"/>
+          </a:effectRef>
+          <a:fontRef idx="minor">
+            <a:schemeClr val="lt1"/>
+          </a:fontRef>
+        </p:style>
+        <p:txBody>
+          <a:bodyPr rtlCol="0" anchor="ctr"/>
+          <a:lstStyle/>
+          <a:p>
+            <a:pPr algn="ctr"/>
+            <a:r>
+              <a:rPr lang="en-US" altLang="ko-KR" dirty="0" smtClean="0">
+                <a:solidFill>
+                  <a:schemeClr val="tx1"/>
+                </a:solidFill>
+                <a:latin typeface="Times New Roman" panose="02020603050405020304" pitchFamily="18" charset="0"/>
+                <a:cs typeface="Times New Roman" panose="02020603050405020304" pitchFamily="18" charset="0"/>
+              </a:rPr>
+              <a:t>PC Extractor</a:t>
+            </a:r>
+            <a:endParaRPr lang="ko-KR" altLang="en-US" dirty="0">
+              <a:solidFill>
+                <a:schemeClr val="tx1"/>
+              </a:solidFill>
+              <a:latin typeface="Times New Roman" panose="02020603050405020304" pitchFamily="18" charset="0"/>
+              <a:cs typeface="Times New Roman" panose="02020603050405020304" pitchFamily="18" charset="0"/>
+            </a:endParaRPr>
+          </a:p>
+        </p:txBody>
+      </p:sp>
+      <p:sp>
+        <p:nvSpPr>
+          <p:cNvPr id="5" name="직사각형 4"/>
+          <p:cNvSpPr/>
+          <p:nvPr/>
+        </p:nvSpPr>
+        <p:spPr>
+          <a:xfrm>
+            <a:off x="4192457" y="1981200"/>
+            <a:ext cx="1677600" cy="323849"/>
+          </a:xfrm>
+          <a:prstGeom prst="rect">
+            <a:avLst/>
+          </a:prstGeom>
+          <a:noFill/>
+          <a:ln w="28575">
+            <a:solidFill>
+              <a:schemeClr val="tx1"/>
+            </a:solidFill>
+          </a:ln>
+        </p:spPr>
+        <p:style>
+          <a:lnRef idx="2">
+            <a:schemeClr val="accent1">
+              <a:shade val="50000"/>
+            </a:schemeClr>
+          </a:lnRef>
+          <a:fillRef idx="1">
+            <a:schemeClr val="accent1"/>
+          </a:fillRef>
+          <a:effectRef idx="0">
+            <a:schemeClr val="accent1"/>
+          </a:effectRef>
+          <a:fontRef idx="minor">
+            <a:schemeClr val="lt1"/>
+          </a:fontRef>
+        </p:style>
+        <p:txBody>
+          <a:bodyPr lIns="0" rIns="0" rtlCol="0" anchor="ctr"/>
+          <a:lstStyle/>
+          <a:p>
+            <a:pPr algn="ctr"/>
+            <a:r>
+              <a:rPr lang="en-US" altLang="ko-KR" dirty="0" smtClean="0">
+                <a:solidFill>
+                  <a:schemeClr val="tx1"/>
+                </a:solidFill>
+                <a:latin typeface="Times New Roman" panose="02020603050405020304" pitchFamily="18" charset="0"/>
+                <a:cs typeface="Times New Roman" panose="02020603050405020304" pitchFamily="18" charset="0"/>
+              </a:rPr>
+              <a:t>Lifetime Monitor</a:t>
+            </a:r>
+            <a:endParaRPr lang="ko-KR" altLang="en-US" dirty="0">
+              <a:solidFill>
+                <a:schemeClr val="tx1"/>
+              </a:solidFill>
+              <a:latin typeface="Times New Roman" panose="02020603050405020304" pitchFamily="18" charset="0"/>
+              <a:cs typeface="Times New Roman" panose="02020603050405020304" pitchFamily="18" charset="0"/>
+            </a:endParaRPr>
+          </a:p>
+        </p:txBody>
+      </p:sp>
+      <p:sp>
+        <p:nvSpPr>
+          <p:cNvPr id="6" name="직사각형 5"/>
+          <p:cNvSpPr/>
+          <p:nvPr/>
+        </p:nvSpPr>
+        <p:spPr>
+          <a:xfrm>
+            <a:off x="2911046" y="2724151"/>
+            <a:ext cx="2233519" cy="571499"/>
+          </a:xfrm>
+          <a:prstGeom prst="rect">
+            <a:avLst/>
+          </a:prstGeom>
+          <a:noFill/>
+          <a:ln w="28575">
+            <a:solidFill>
+              <a:schemeClr val="tx1"/>
+            </a:solidFill>
+          </a:ln>
+        </p:spPr>
+        <p:style>
+          <a:lnRef idx="2">
+            <a:schemeClr val="accent1">
+              <a:shade val="50000"/>
+            </a:schemeClr>
+          </a:lnRef>
+          <a:fillRef idx="1">
+            <a:schemeClr val="accent1"/>
+          </a:fillRef>
+          <a:effectRef idx="0">
+            <a:schemeClr val="accent1"/>
+          </a:effectRef>
+          <a:fontRef idx="minor">
+            <a:schemeClr val="lt1"/>
+          </a:fontRef>
+        </p:style>
+        <p:txBody>
+          <a:bodyPr tIns="0" bIns="0" rtlCol="0" anchor="t"/>
+          <a:lstStyle/>
+          <a:p>
+            <a:pPr algn="ctr"/>
+            <a:r>
+              <a:rPr lang="en-US" altLang="ko-KR" dirty="0" smtClean="0">
+                <a:solidFill>
+                  <a:schemeClr val="tx1"/>
+                </a:solidFill>
+                <a:latin typeface="Times New Roman" panose="02020603050405020304" pitchFamily="18" charset="0"/>
+                <a:cs typeface="Times New Roman" panose="02020603050405020304" pitchFamily="18" charset="0"/>
+              </a:rPr>
+              <a:t>PC-Lifetime Analyzer</a:t>
+            </a:r>
+            <a:endParaRPr lang="ko-KR" altLang="en-US" dirty="0">
+              <a:solidFill>
+                <a:schemeClr val="tx1"/>
+              </a:solidFill>
+              <a:latin typeface="Times New Roman" panose="02020603050405020304" pitchFamily="18" charset="0"/>
+              <a:cs typeface="Times New Roman" panose="02020603050405020304" pitchFamily="18" charset="0"/>
+            </a:endParaRPr>
+          </a:p>
+        </p:txBody>
+      </p:sp>
+      <p:cxnSp>
+        <p:nvCxnSpPr>
+          <p:cNvPr id="8" name="직선 연결선 7"/>
+          <p:cNvCxnSpPr/>
+          <p:nvPr/>
+        </p:nvCxnSpPr>
+        <p:spPr>
+          <a:xfrm>
+            <a:off x="1432157" y="1160780"/>
+            <a:ext cx="4549543" cy="0"/>
+          </a:xfrm>
+          <a:prstGeom prst="line">
+            <a:avLst/>
+          </a:prstGeom>
+          <a:ln w="25400">
+            <a:solidFill>
+              <a:schemeClr val="tx1"/>
+            </a:solidFill>
+          </a:ln>
+        </p:spPr>
+        <p:style>
+          <a:lnRef idx="1">
+            <a:schemeClr val="accent1"/>
+          </a:lnRef>
+          <a:fillRef idx="0">
+            <a:schemeClr val="accent1"/>
+          </a:fillRef>
+          <a:effectRef idx="0">
+            <a:schemeClr val="accent1"/>
+          </a:effectRef>
+          <a:fontRef idx="minor">
+            <a:schemeClr val="tx1"/>
+          </a:fontRef>
+        </p:style>
+      </p:cxnSp>
+      <p:cxnSp>
+        <p:nvCxnSpPr>
+          <p:cNvPr id="10" name="직선 화살표 연결선 9"/>
+          <p:cNvCxnSpPr>
+            <a:stCxn id="11" idx="2"/>
+            <a:endCxn id="4" idx="0"/>
+          </p:cNvCxnSpPr>
+          <p:nvPr/>
+        </p:nvCxnSpPr>
+        <p:spPr>
+          <a:xfrm>
+            <a:off x="3024505" y="1492249"/>
+            <a:ext cx="0" cy="488952"/>
+          </a:xfrm>
+          <a:prstGeom prst="straightConnector1">
+            <a:avLst/>
+          </a:prstGeom>
+          <a:ln w="19050">
+            <a:solidFill>
+              <a:schemeClr val="tx1"/>
+            </a:solidFill>
+            <a:prstDash val="sysDash"/>
+            <a:tailEnd type="triangle" w="lg" len="med"/>
+          </a:ln>
+        </p:spPr>
+        <p:style>
+          <a:lnRef idx="1">
+            <a:schemeClr val="accent1"/>
+          </a:lnRef>
+          <a:fillRef idx="0">
+            <a:schemeClr val="accent1"/>
+          </a:fillRef>
+          <a:effectRef idx="0">
+            <a:schemeClr val="accent1"/>
+          </a:effectRef>
+          <a:fontRef idx="minor">
+            <a:schemeClr val="tx1"/>
+          </a:fontRef>
+        </p:style>
+      </p:cxnSp>
+      <p:sp>
+        <p:nvSpPr>
+          <p:cNvPr id="11" name="직사각형 10"/>
+          <p:cNvSpPr/>
+          <p:nvPr/>
+        </p:nvSpPr>
+        <p:spPr>
+          <a:xfrm>
+            <a:off x="2331085" y="1168400"/>
+            <a:ext cx="1386840" cy="323849"/>
+          </a:xfrm>
+          <a:prstGeom prst="rect">
+            <a:avLst/>
+          </a:prstGeom>
+          <a:noFill/>
+          <a:ln w="28575">
+            <a:solidFill>
+              <a:schemeClr val="tx1"/>
+            </a:solidFill>
+          </a:ln>
+        </p:spPr>
+        <p:style>
+          <a:lnRef idx="2">
+            <a:schemeClr val="accent1">
+              <a:shade val="50000"/>
+            </a:schemeClr>
+          </a:lnRef>
+          <a:fillRef idx="1">
+            <a:schemeClr val="accent1"/>
+          </a:fillRef>
+          <a:effectRef idx="0">
+            <a:schemeClr val="accent1"/>
+          </a:effectRef>
+          <a:fontRef idx="minor">
+            <a:schemeClr val="lt1"/>
+          </a:fontRef>
+        </p:style>
+        <p:txBody>
+          <a:bodyPr lIns="0" rIns="0" rtlCol="0" anchor="ctr"/>
+          <a:lstStyle/>
+          <a:p>
+            <a:pPr algn="ctr"/>
+            <a:r>
+              <a:rPr lang="en-US" altLang="ko-KR" sz="1600" dirty="0" smtClean="0">
+                <a:solidFill>
+                  <a:schemeClr val="tx1"/>
+                </a:solidFill>
+                <a:latin typeface="Times New Roman" panose="02020603050405020304" pitchFamily="18" charset="0"/>
+                <a:cs typeface="Times New Roman" panose="02020603050405020304" pitchFamily="18" charset="0"/>
+              </a:rPr>
+              <a:t>Write Handler</a:t>
+            </a:r>
+            <a:endParaRPr lang="ko-KR" altLang="en-US" sz="1600" dirty="0">
+              <a:solidFill>
+                <a:schemeClr val="tx1"/>
+              </a:solidFill>
+              <a:latin typeface="Times New Roman" panose="02020603050405020304" pitchFamily="18" charset="0"/>
+              <a:cs typeface="Times New Roman" panose="02020603050405020304" pitchFamily="18" charset="0"/>
+            </a:endParaRPr>
+          </a:p>
+        </p:txBody>
+      </p:sp>
+      <p:sp>
+        <p:nvSpPr>
+          <p:cNvPr id="13" name="직사각형 12"/>
+          <p:cNvSpPr/>
+          <p:nvPr/>
+        </p:nvSpPr>
+        <p:spPr>
+          <a:xfrm>
+            <a:off x="4338075" y="1168399"/>
+            <a:ext cx="1386840" cy="323849"/>
+          </a:xfrm>
+          <a:prstGeom prst="rect">
+            <a:avLst/>
+          </a:prstGeom>
+          <a:noFill/>
+          <a:ln w="28575">
+            <a:solidFill>
+              <a:schemeClr val="tx1"/>
+            </a:solidFill>
+          </a:ln>
+        </p:spPr>
+        <p:style>
+          <a:lnRef idx="2">
+            <a:schemeClr val="accent1">
+              <a:shade val="50000"/>
+            </a:schemeClr>
+          </a:lnRef>
+          <a:fillRef idx="1">
+            <a:schemeClr val="accent1"/>
+          </a:fillRef>
+          <a:effectRef idx="0">
+            <a:schemeClr val="accent1"/>
+          </a:effectRef>
+          <a:fontRef idx="minor">
+            <a:schemeClr val="lt1"/>
+          </a:fontRef>
+        </p:style>
+        <p:txBody>
+          <a:bodyPr lIns="0" rIns="0" rtlCol="0" anchor="ctr"/>
+          <a:lstStyle/>
+          <a:p>
+            <a:pPr algn="ctr"/>
+            <a:r>
+              <a:rPr lang="en-US" altLang="ko-KR" sz="1600" dirty="0" smtClean="0">
+                <a:solidFill>
+                  <a:schemeClr val="tx1"/>
+                </a:solidFill>
+                <a:latin typeface="Times New Roman" panose="02020603050405020304" pitchFamily="18" charset="0"/>
+                <a:cs typeface="Times New Roman" panose="02020603050405020304" pitchFamily="18" charset="0"/>
+              </a:rPr>
+              <a:t>TRIM Handler</a:t>
+            </a:r>
+            <a:endParaRPr lang="ko-KR" altLang="en-US" sz="1600" dirty="0">
+              <a:solidFill>
+                <a:schemeClr val="tx1"/>
+              </a:solidFill>
+              <a:latin typeface="Times New Roman" panose="02020603050405020304" pitchFamily="18" charset="0"/>
+              <a:cs typeface="Times New Roman" panose="02020603050405020304" pitchFamily="18" charset="0"/>
+            </a:endParaRPr>
+          </a:p>
+        </p:txBody>
+      </p:sp>
+      <p:cxnSp>
+        <p:nvCxnSpPr>
+          <p:cNvPr id="16" name="직선 화살표 연결선 15"/>
+          <p:cNvCxnSpPr>
+            <a:stCxn id="11" idx="2"/>
+            <a:endCxn id="5" idx="0"/>
+          </p:cNvCxnSpPr>
+          <p:nvPr/>
+        </p:nvCxnSpPr>
+        <p:spPr>
+          <a:xfrm>
+            <a:off x="3024505" y="1492249"/>
+            <a:ext cx="2006752" cy="488951"/>
+          </a:xfrm>
+          <a:prstGeom prst="straightConnector1">
+            <a:avLst/>
+          </a:prstGeom>
+          <a:ln w="19050">
+            <a:solidFill>
+              <a:schemeClr val="tx1"/>
+            </a:solidFill>
+            <a:prstDash val="sysDash"/>
+            <a:tailEnd type="triangle" w="lg" len="med"/>
+          </a:ln>
+        </p:spPr>
+        <p:style>
+          <a:lnRef idx="1">
+            <a:schemeClr val="accent1"/>
+          </a:lnRef>
+          <a:fillRef idx="0">
+            <a:schemeClr val="accent1"/>
+          </a:fillRef>
+          <a:effectRef idx="0">
+            <a:schemeClr val="accent1"/>
+          </a:effectRef>
+          <a:fontRef idx="minor">
+            <a:schemeClr val="tx1"/>
+          </a:fontRef>
+        </p:style>
+      </p:cxnSp>
+      <p:cxnSp>
+        <p:nvCxnSpPr>
+          <p:cNvPr id="19" name="직선 화살표 연결선 18"/>
+          <p:cNvCxnSpPr>
+            <a:stCxn id="13" idx="2"/>
+            <a:endCxn id="5" idx="0"/>
+          </p:cNvCxnSpPr>
+          <p:nvPr/>
+        </p:nvCxnSpPr>
+        <p:spPr>
+          <a:xfrm flipH="1">
+            <a:off x="5031257" y="1492248"/>
+            <a:ext cx="238" cy="488952"/>
+          </a:xfrm>
+          <a:prstGeom prst="straightConnector1">
+            <a:avLst/>
+          </a:prstGeom>
+          <a:ln w="19050">
+            <a:solidFill>
+              <a:schemeClr val="tx1"/>
+            </a:solidFill>
+            <a:prstDash val="sysDash"/>
+            <a:tailEnd type="triangle" w="lg" len="med"/>
+          </a:ln>
+        </p:spPr>
+        <p:style>
+          <a:lnRef idx="1">
+            <a:schemeClr val="accent1"/>
+          </a:lnRef>
+          <a:fillRef idx="0">
+            <a:schemeClr val="accent1"/>
+          </a:fillRef>
+          <a:effectRef idx="0">
+            <a:schemeClr val="accent1"/>
+          </a:effectRef>
+          <a:fontRef idx="minor">
+            <a:schemeClr val="tx1"/>
+          </a:fontRef>
+        </p:style>
+      </p:cxnSp>
+      <p:cxnSp>
+        <p:nvCxnSpPr>
+          <p:cNvPr id="22" name="직선 화살표 연결선 21"/>
+          <p:cNvCxnSpPr>
+            <a:stCxn id="4" idx="2"/>
+            <a:endCxn id="6" idx="0"/>
+          </p:cNvCxnSpPr>
+          <p:nvPr/>
+        </p:nvCxnSpPr>
+        <p:spPr>
+          <a:xfrm>
+            <a:off x="3024505" y="2305050"/>
+            <a:ext cx="1003301" cy="419101"/>
+          </a:xfrm>
+          <a:prstGeom prst="straightConnector1">
+            <a:avLst/>
+          </a:prstGeom>
+          <a:ln w="19050">
+            <a:solidFill>
+              <a:schemeClr val="tx1"/>
+            </a:solidFill>
+            <a:prstDash val="sysDash"/>
+            <a:tailEnd type="triangle" w="lg" len="med"/>
+          </a:ln>
+        </p:spPr>
+        <p:style>
+          <a:lnRef idx="1">
+            <a:schemeClr val="accent1"/>
+          </a:lnRef>
+          <a:fillRef idx="0">
+            <a:schemeClr val="accent1"/>
+          </a:fillRef>
+          <a:effectRef idx="0">
+            <a:schemeClr val="accent1"/>
+          </a:effectRef>
+          <a:fontRef idx="minor">
+            <a:schemeClr val="tx1"/>
+          </a:fontRef>
+        </p:style>
+      </p:cxnSp>
+      <p:cxnSp>
+        <p:nvCxnSpPr>
+          <p:cNvPr id="25" name="직선 화살표 연결선 24"/>
+          <p:cNvCxnSpPr>
+            <a:stCxn id="5" idx="2"/>
+            <a:endCxn id="6" idx="0"/>
+          </p:cNvCxnSpPr>
+          <p:nvPr/>
+        </p:nvCxnSpPr>
+        <p:spPr>
+          <a:xfrm flipH="1">
+            <a:off x="4027806" y="2305049"/>
+            <a:ext cx="1003451" cy="419102"/>
+          </a:xfrm>
+          <a:prstGeom prst="straightConnector1">
+            <a:avLst/>
+          </a:prstGeom>
+          <a:ln w="19050">
+            <a:solidFill>
+              <a:schemeClr val="tx1"/>
+            </a:solidFill>
+            <a:prstDash val="sysDash"/>
+            <a:tailEnd type="triangle" w="lg" len="med"/>
+          </a:ln>
+        </p:spPr>
+        <p:style>
+          <a:lnRef idx="1">
+            <a:schemeClr val="accent1"/>
+          </a:lnRef>
+          <a:fillRef idx="0">
+            <a:schemeClr val="accent1"/>
+          </a:fillRef>
+          <a:effectRef idx="0">
+            <a:schemeClr val="accent1"/>
+          </a:effectRef>
+          <a:fontRef idx="minor">
+            <a:schemeClr val="tx1"/>
+          </a:fontRef>
+        </p:style>
+      </p:cxnSp>
+      <p:sp>
+        <p:nvSpPr>
+          <p:cNvPr id="29" name="TextBox 28"/>
+          <p:cNvSpPr txBox="1"/>
+          <p:nvPr/>
+        </p:nvSpPr>
+        <p:spPr>
+          <a:xfrm>
+            <a:off x="2094389" y="1505892"/>
+            <a:ext cx="1021433" cy="461665"/>
+          </a:xfrm>
+          <a:prstGeom prst="rect">
+            <a:avLst/>
+          </a:prstGeom>
+          <a:noFill/>
+        </p:spPr>
+        <p:txBody>
+          <a:bodyPr wrap="none" rtlCol="0">
+            <a:spAutoFit/>
+          </a:bodyPr>
+          <a:lstStyle/>
+          <a:p>
             <a:r>
               <a:rPr lang="en-US" altLang="ko-KR" sz="1200" dirty="0" smtClean="0">
                 <a:latin typeface="Times New Roman" panose="02020603050405020304" pitchFamily="18" charset="0"/>
                 <a:cs typeface="Times New Roman" panose="02020603050405020304" pitchFamily="18" charset="0"/>
               </a:rPr>
-              <a:t>Size</a:t>
-            </a:r>
+              <a:t>User Process </a:t>
+            </a:r>
+          </a:p>
+          <a:p>
             <a:r>
               <a:rPr lang="en-US" altLang="ko-KR" sz="1200" dirty="0" smtClean="0">
                 <a:latin typeface="Times New Roman" panose="02020603050405020304" pitchFamily="18" charset="0"/>
                 <a:cs typeface="Times New Roman" panose="02020603050405020304" pitchFamily="18" charset="0"/>
               </a:rPr>
-              <a:t>, …)</a:t>
+              <a:t>Stack Info.</a:t>
+            </a:r>
+            <a:endParaRPr lang="ko-KR" altLang="en-US" sz="1200" dirty="0">
+              <a:latin typeface="Times New Roman" panose="02020603050405020304" pitchFamily="18" charset="0"/>
+              <a:cs typeface="Times New Roman" panose="02020603050405020304" pitchFamily="18" charset="0"/>
+            </a:endParaRPr>
+          </a:p>
+        </p:txBody>
+      </p:sp>
+      <p:sp>
+        <p:nvSpPr>
+          <p:cNvPr id="30" name="TextBox 29"/>
+          <p:cNvSpPr txBox="1"/>
+          <p:nvPr/>
+        </p:nvSpPr>
+        <p:spPr>
+          <a:xfrm>
+            <a:off x="3800709" y="1461442"/>
+            <a:ext cx="492443" cy="276999"/>
+          </a:xfrm>
+          <a:prstGeom prst="rect">
+            <a:avLst/>
+          </a:prstGeom>
+          <a:noFill/>
+        </p:spPr>
+        <p:txBody>
+          <a:bodyPr wrap="none" rtlCol="0">
+            <a:spAutoFit/>
+          </a:bodyPr>
+          <a:lstStyle/>
+          <a:p>
+            <a:r>
+              <a:rPr lang="en-US" altLang="ko-KR" sz="1200" dirty="0" smtClean="0">
+                <a:latin typeface="Times New Roman" panose="02020603050405020304" pitchFamily="18" charset="0"/>
+                <a:cs typeface="Times New Roman" panose="02020603050405020304" pitchFamily="18" charset="0"/>
+              </a:rPr>
+              <a:t>LBA</a:t>
+            </a:r>
+            <a:endParaRPr lang="ko-KR" altLang="en-US" sz="1200" dirty="0">
+              <a:latin typeface="Times New Roman" panose="02020603050405020304" pitchFamily="18" charset="0"/>
+              <a:cs typeface="Times New Roman" panose="02020603050405020304" pitchFamily="18" charset="0"/>
+            </a:endParaRPr>
+          </a:p>
+        </p:txBody>
+      </p:sp>
+      <p:sp>
+        <p:nvSpPr>
+          <p:cNvPr id="31" name="TextBox 30"/>
+          <p:cNvSpPr txBox="1"/>
+          <p:nvPr/>
+        </p:nvSpPr>
+        <p:spPr>
+          <a:xfrm>
+            <a:off x="4981007" y="1598224"/>
+            <a:ext cx="492443" cy="276999"/>
+          </a:xfrm>
+          <a:prstGeom prst="rect">
+            <a:avLst/>
+          </a:prstGeom>
+          <a:noFill/>
+        </p:spPr>
+        <p:txBody>
+          <a:bodyPr wrap="none" rtlCol="0">
+            <a:spAutoFit/>
+          </a:bodyPr>
+          <a:lstStyle/>
+          <a:p>
+            <a:r>
+              <a:rPr lang="en-US" altLang="ko-KR" sz="1200" dirty="0" smtClean="0">
+                <a:latin typeface="Times New Roman" panose="02020603050405020304" pitchFamily="18" charset="0"/>
+                <a:cs typeface="Times New Roman" panose="02020603050405020304" pitchFamily="18" charset="0"/>
+              </a:rPr>
+              <a:t>LBA</a:t>
+            </a:r>
+            <a:endParaRPr lang="ko-KR" altLang="en-US" sz="1200" dirty="0">
+              <a:latin typeface="Times New Roman" panose="02020603050405020304" pitchFamily="18" charset="0"/>
+              <a:cs typeface="Times New Roman" panose="02020603050405020304" pitchFamily="18" charset="0"/>
+            </a:endParaRPr>
+          </a:p>
+        </p:txBody>
+      </p:sp>
+      <p:sp>
+        <p:nvSpPr>
+          <p:cNvPr id="32" name="TextBox 31"/>
+          <p:cNvSpPr txBox="1"/>
+          <p:nvPr/>
+        </p:nvSpPr>
+        <p:spPr>
+          <a:xfrm>
+            <a:off x="2771547" y="2387252"/>
+            <a:ext cx="745717" cy="276999"/>
+          </a:xfrm>
+          <a:prstGeom prst="rect">
+            <a:avLst/>
+          </a:prstGeom>
+          <a:noFill/>
+        </p:spPr>
+        <p:txBody>
+          <a:bodyPr wrap="none" rtlCol="0">
+            <a:spAutoFit/>
+          </a:bodyPr>
+          <a:lstStyle/>
+          <a:p>
+            <a:r>
+              <a:rPr lang="en-US" altLang="ko-KR" sz="1200" dirty="0" smtClean="0">
+                <a:latin typeface="Times New Roman" panose="02020603050405020304" pitchFamily="18" charset="0"/>
+                <a:cs typeface="Times New Roman" panose="02020603050405020304" pitchFamily="18" charset="0"/>
+              </a:rPr>
+              <a:t>PC value</a:t>
+            </a:r>
+            <a:endParaRPr lang="ko-KR" altLang="en-US" sz="1200" dirty="0">
+              <a:latin typeface="Times New Roman" panose="02020603050405020304" pitchFamily="18" charset="0"/>
+              <a:cs typeface="Times New Roman" panose="02020603050405020304" pitchFamily="18" charset="0"/>
+            </a:endParaRPr>
+          </a:p>
+        </p:txBody>
+      </p:sp>
+      <p:sp>
+        <p:nvSpPr>
+          <p:cNvPr id="33" name="아래쪽 화살표 32"/>
+          <p:cNvSpPr/>
+          <p:nvPr/>
+        </p:nvSpPr>
+        <p:spPr>
+          <a:xfrm>
+            <a:off x="2897313" y="912534"/>
+            <a:ext cx="218509" cy="244754"/>
+          </a:xfrm>
+          <a:prstGeom prst="downArrow">
+            <a:avLst>
+              <a:gd name="adj1" fmla="val 50000"/>
+              <a:gd name="adj2" fmla="val 32564"/>
+            </a:avLst>
+          </a:prstGeom>
+          <a:solidFill>
+            <a:schemeClr val="bg1"/>
+          </a:solidFill>
+          <a:ln>
+            <a:solidFill>
+              <a:schemeClr val="tx1"/>
+            </a:solidFill>
+          </a:ln>
+        </p:spPr>
+        <p:style>
+          <a:lnRef idx="2">
+            <a:schemeClr val="accent1">
+              <a:shade val="50000"/>
+            </a:schemeClr>
+          </a:lnRef>
+          <a:fillRef idx="1">
+            <a:schemeClr val="accent1"/>
+          </a:fillRef>
+          <a:effectRef idx="0">
+            <a:schemeClr val="accent1"/>
+          </a:effectRef>
+          <a:fontRef idx="minor">
+            <a:schemeClr val="lt1"/>
+          </a:fontRef>
+        </p:style>
+        <p:txBody>
+          <a:bodyPr rtlCol="0" anchor="ctr"/>
+          <a:lstStyle/>
+          <a:p>
+            <a:pPr algn="ctr"/>
+            <a:endParaRPr lang="ko-KR" altLang="en-US"/>
+          </a:p>
+        </p:txBody>
+      </p:sp>
+      <p:sp>
+        <p:nvSpPr>
+          <p:cNvPr id="34" name="TextBox 33"/>
+          <p:cNvSpPr txBox="1"/>
+          <p:nvPr/>
+        </p:nvSpPr>
+        <p:spPr>
+          <a:xfrm>
+            <a:off x="2689154" y="624061"/>
+            <a:ext cx="646139" cy="338554"/>
+          </a:xfrm>
+          <a:prstGeom prst="rect">
+            <a:avLst/>
+          </a:prstGeom>
+          <a:noFill/>
+        </p:spPr>
+        <p:txBody>
+          <a:bodyPr wrap="none" rtlCol="0">
+            <a:spAutoFit/>
+          </a:bodyPr>
+          <a:lstStyle/>
+          <a:p>
+            <a:r>
+              <a:rPr lang="en-US" altLang="ko-KR" sz="1600" dirty="0" smtClean="0">
+                <a:latin typeface="Times New Roman" panose="02020603050405020304" pitchFamily="18" charset="0"/>
+                <a:cs typeface="Times New Roman" panose="02020603050405020304" pitchFamily="18" charset="0"/>
+              </a:rPr>
+              <a:t>Write</a:t>
+            </a:r>
+            <a:endParaRPr lang="ko-KR" altLang="en-US" sz="1600" dirty="0">
+              <a:latin typeface="Times New Roman" panose="02020603050405020304" pitchFamily="18" charset="0"/>
+              <a:cs typeface="Times New Roman" panose="02020603050405020304" pitchFamily="18" charset="0"/>
+            </a:endParaRPr>
+          </a:p>
+        </p:txBody>
+      </p:sp>
+      <p:sp>
+        <p:nvSpPr>
+          <p:cNvPr id="36" name="TextBox 35"/>
+          <p:cNvSpPr txBox="1"/>
+          <p:nvPr/>
+        </p:nvSpPr>
+        <p:spPr>
+          <a:xfrm>
+            <a:off x="4617671" y="624061"/>
+            <a:ext cx="721672" cy="338554"/>
+          </a:xfrm>
+          <a:prstGeom prst="rect">
+            <a:avLst/>
+          </a:prstGeom>
+          <a:noFill/>
+        </p:spPr>
+        <p:txBody>
+          <a:bodyPr wrap="none" rtlCol="0">
+            <a:spAutoFit/>
+          </a:bodyPr>
+          <a:lstStyle/>
+          <a:p>
+            <a:r>
+              <a:rPr lang="en-US" altLang="ko-KR" sz="1600" dirty="0" smtClean="0">
+                <a:latin typeface="Times New Roman" panose="02020603050405020304" pitchFamily="18" charset="0"/>
+                <a:cs typeface="Times New Roman" panose="02020603050405020304" pitchFamily="18" charset="0"/>
+              </a:rPr>
+              <a:t>Delete</a:t>
+            </a:r>
+            <a:endParaRPr lang="ko-KR" altLang="en-US" sz="1600" dirty="0">
+              <a:latin typeface="Times New Roman" panose="02020603050405020304" pitchFamily="18" charset="0"/>
+              <a:cs typeface="Times New Roman" panose="02020603050405020304" pitchFamily="18" charset="0"/>
+            </a:endParaRPr>
+          </a:p>
+        </p:txBody>
+      </p:sp>
+      <p:sp>
+        <p:nvSpPr>
+          <p:cNvPr id="37" name="TextBox 36"/>
+          <p:cNvSpPr txBox="1"/>
+          <p:nvPr/>
+        </p:nvSpPr>
+        <p:spPr>
+          <a:xfrm>
+            <a:off x="1432157" y="1141109"/>
+            <a:ext cx="790601" cy="338554"/>
+          </a:xfrm>
+          <a:prstGeom prst="rect">
+            <a:avLst/>
+          </a:prstGeom>
+          <a:noFill/>
+        </p:spPr>
+        <p:txBody>
+          <a:bodyPr wrap="none" rtlCol="0">
+            <a:spAutoFit/>
+          </a:bodyPr>
+          <a:lstStyle/>
+          <a:p>
+            <a:r>
+              <a:rPr lang="en-US" altLang="ko-KR" sz="1600" b="1" dirty="0" smtClean="0">
+                <a:latin typeface="Times New Roman" panose="02020603050405020304" pitchFamily="18" charset="0"/>
+                <a:cs typeface="Times New Roman" panose="02020603050405020304" pitchFamily="18" charset="0"/>
+              </a:rPr>
+              <a:t>Kernel</a:t>
+            </a:r>
+          </a:p>
+        </p:txBody>
+      </p:sp>
+      <p:sp>
+        <p:nvSpPr>
+          <p:cNvPr id="38" name="TextBox 37"/>
+          <p:cNvSpPr txBox="1"/>
+          <p:nvPr/>
+        </p:nvSpPr>
+        <p:spPr>
+          <a:xfrm>
+            <a:off x="1432157" y="826950"/>
+            <a:ext cx="1212191" cy="338554"/>
+          </a:xfrm>
+          <a:prstGeom prst="rect">
+            <a:avLst/>
+          </a:prstGeom>
+          <a:noFill/>
+        </p:spPr>
+        <p:txBody>
+          <a:bodyPr wrap="none" rtlCol="0">
+            <a:spAutoFit/>
+          </a:bodyPr>
+          <a:lstStyle/>
+          <a:p>
+            <a:r>
+              <a:rPr lang="en-US" altLang="ko-KR" sz="1600" b="1" dirty="0" smtClean="0">
+                <a:latin typeface="Times New Roman" panose="02020603050405020304" pitchFamily="18" charset="0"/>
+                <a:cs typeface="Times New Roman" panose="02020603050405020304" pitchFamily="18" charset="0"/>
+              </a:rPr>
+              <a:t>Application</a:t>
+            </a:r>
+          </a:p>
+        </p:txBody>
+      </p:sp>
+      <p:sp>
+        <p:nvSpPr>
+          <p:cNvPr id="44" name="직사각형 43"/>
+          <p:cNvSpPr/>
+          <p:nvPr/>
+        </p:nvSpPr>
+        <p:spPr>
+          <a:xfrm>
+            <a:off x="2716267" y="3562352"/>
+            <a:ext cx="2623076" cy="695324"/>
+          </a:xfrm>
+          <a:prstGeom prst="rect">
+            <a:avLst/>
+          </a:prstGeom>
+          <a:noFill/>
+          <a:ln w="28575">
+            <a:solidFill>
+              <a:schemeClr val="tx1"/>
+            </a:solidFill>
+          </a:ln>
+        </p:spPr>
+        <p:style>
+          <a:lnRef idx="2">
+            <a:schemeClr val="accent1">
+              <a:shade val="50000"/>
+            </a:schemeClr>
+          </a:lnRef>
+          <a:fillRef idx="1">
+            <a:schemeClr val="accent1"/>
+          </a:fillRef>
+          <a:effectRef idx="0">
+            <a:schemeClr val="accent1"/>
+          </a:effectRef>
+          <a:fontRef idx="minor">
+            <a:schemeClr val="lt1"/>
+          </a:fontRef>
+        </p:style>
+        <p:txBody>
+          <a:bodyPr rtlCol="0" anchor="t"/>
+          <a:lstStyle/>
+          <a:p>
+            <a:pPr algn="ctr"/>
+            <a:r>
+              <a:rPr lang="en-US" altLang="ko-KR" dirty="0" smtClean="0">
+                <a:solidFill>
+                  <a:schemeClr val="tx1"/>
+                </a:solidFill>
+                <a:latin typeface="Times New Roman" panose="02020603050405020304" pitchFamily="18" charset="0"/>
+                <a:cs typeface="Times New Roman" panose="02020603050405020304" pitchFamily="18" charset="0"/>
+              </a:rPr>
+              <a:t>Stream Allocation Module</a:t>
+            </a:r>
+            <a:endParaRPr lang="ko-KR" altLang="en-US" dirty="0">
+              <a:solidFill>
+                <a:schemeClr val="tx1"/>
+              </a:solidFill>
+              <a:latin typeface="Times New Roman" panose="02020603050405020304" pitchFamily="18" charset="0"/>
+              <a:cs typeface="Times New Roman" panose="02020603050405020304" pitchFamily="18" charset="0"/>
+            </a:endParaRPr>
+          </a:p>
+        </p:txBody>
+      </p:sp>
+      <p:sp>
+        <p:nvSpPr>
+          <p:cNvPr id="45" name="TextBox 44"/>
+          <p:cNvSpPr txBox="1"/>
+          <p:nvPr/>
+        </p:nvSpPr>
+        <p:spPr>
+          <a:xfrm>
+            <a:off x="4777739" y="2302902"/>
+            <a:ext cx="1116011" cy="461665"/>
+          </a:xfrm>
+          <a:prstGeom prst="rect">
+            <a:avLst/>
+          </a:prstGeom>
+          <a:noFill/>
+        </p:spPr>
+        <p:txBody>
+          <a:bodyPr wrap="none" rtlCol="0">
+            <a:spAutoFit/>
+          </a:bodyPr>
+          <a:lstStyle/>
+          <a:p>
+            <a:r>
+              <a:rPr lang="en-US" altLang="ko-KR" sz="1200" dirty="0" smtClean="0">
+                <a:latin typeface="Times New Roman" panose="02020603050405020304" pitchFamily="18" charset="0"/>
+                <a:cs typeface="Times New Roman" panose="02020603050405020304" pitchFamily="18" charset="0"/>
+              </a:rPr>
+              <a:t>Update/Delete </a:t>
+            </a:r>
+          </a:p>
+          <a:p>
+            <a:r>
+              <a:rPr lang="en-US" altLang="ko-KR" sz="1200" dirty="0" smtClean="0">
+                <a:latin typeface="Times New Roman" panose="02020603050405020304" pitchFamily="18" charset="0"/>
+                <a:cs typeface="Times New Roman" panose="02020603050405020304" pitchFamily="18" charset="0"/>
+              </a:rPr>
+              <a:t>Time</a:t>
+            </a:r>
+            <a:endParaRPr lang="ko-KR" altLang="en-US" sz="1200" dirty="0">
+              <a:latin typeface="Times New Roman" panose="02020603050405020304" pitchFamily="18" charset="0"/>
+              <a:cs typeface="Times New Roman" panose="02020603050405020304" pitchFamily="18" charset="0"/>
+            </a:endParaRPr>
+          </a:p>
+        </p:txBody>
+      </p:sp>
+      <p:cxnSp>
+        <p:nvCxnSpPr>
+          <p:cNvPr id="46" name="직선 화살표 연결선 45"/>
+          <p:cNvCxnSpPr>
+            <a:stCxn id="6" idx="2"/>
+            <a:endCxn id="44" idx="0"/>
+          </p:cNvCxnSpPr>
+          <p:nvPr/>
+        </p:nvCxnSpPr>
+        <p:spPr>
+          <a:xfrm flipH="1">
+            <a:off x="4027805" y="3295650"/>
+            <a:ext cx="1" cy="266702"/>
+          </a:xfrm>
+          <a:prstGeom prst="straightConnector1">
+            <a:avLst/>
+          </a:prstGeom>
+          <a:ln w="19050">
+            <a:solidFill>
+              <a:schemeClr val="tx1"/>
+            </a:solidFill>
+            <a:prstDash val="sysDash"/>
+            <a:tailEnd type="triangle" w="lg" len="med"/>
+          </a:ln>
+        </p:spPr>
+        <p:style>
+          <a:lnRef idx="1">
+            <a:schemeClr val="accent1"/>
+          </a:lnRef>
+          <a:fillRef idx="0">
+            <a:schemeClr val="accent1"/>
+          </a:fillRef>
+          <a:effectRef idx="0">
+            <a:schemeClr val="accent1"/>
+          </a:effectRef>
+          <a:fontRef idx="minor">
+            <a:schemeClr val="tx1"/>
+          </a:fontRef>
+        </p:style>
+      </p:cxnSp>
+      <p:sp>
+        <p:nvSpPr>
+          <p:cNvPr id="49" name="TextBox 48"/>
+          <p:cNvSpPr txBox="1"/>
+          <p:nvPr/>
+        </p:nvSpPr>
+        <p:spPr>
+          <a:xfrm>
+            <a:off x="4050941" y="3286979"/>
+            <a:ext cx="1516762" cy="276999"/>
+          </a:xfrm>
+          <a:prstGeom prst="rect">
+            <a:avLst/>
+          </a:prstGeom>
+          <a:noFill/>
+        </p:spPr>
+        <p:txBody>
+          <a:bodyPr wrap="none" rtlCol="0">
+            <a:spAutoFit/>
+          </a:bodyPr>
+          <a:lstStyle/>
+          <a:p>
+            <a:r>
+              <a:rPr lang="en-US" altLang="ko-KR" sz="1200" dirty="0" smtClean="0">
+                <a:latin typeface="Times New Roman" panose="02020603050405020304" pitchFamily="18" charset="0"/>
+                <a:cs typeface="Times New Roman" panose="02020603050405020304" pitchFamily="18" charset="0"/>
+              </a:rPr>
+              <a:t>(PC Group, Lifetime)</a:t>
+            </a:r>
+            <a:endParaRPr lang="ko-KR" altLang="en-US" sz="1200" dirty="0">
+              <a:latin typeface="Times New Roman" panose="02020603050405020304" pitchFamily="18" charset="0"/>
+              <a:cs typeface="Times New Roman" panose="02020603050405020304" pitchFamily="18" charset="0"/>
+            </a:endParaRPr>
+          </a:p>
+        </p:txBody>
+      </p:sp>
+      <p:sp>
+        <p:nvSpPr>
+          <p:cNvPr id="52" name="모서리가 둥근 직사각형 51"/>
+          <p:cNvSpPr/>
+          <p:nvPr/>
+        </p:nvSpPr>
+        <p:spPr>
+          <a:xfrm>
+            <a:off x="3470943" y="3938589"/>
+            <a:ext cx="1103630" cy="236571"/>
+          </a:xfrm>
+          <a:prstGeom prst="roundRect">
+            <a:avLst/>
+          </a:prstGeom>
+          <a:solidFill>
+            <a:schemeClr val="bg1">
+              <a:lumMod val="85000"/>
+            </a:schemeClr>
+          </a:solidFill>
+          <a:ln>
+            <a:solidFill>
+              <a:schemeClr val="tx1"/>
+            </a:solidFill>
+          </a:ln>
+        </p:spPr>
+        <p:style>
+          <a:lnRef idx="2">
+            <a:schemeClr val="accent1">
+              <a:shade val="50000"/>
+            </a:schemeClr>
+          </a:lnRef>
+          <a:fillRef idx="1">
+            <a:schemeClr val="accent1"/>
+          </a:fillRef>
+          <a:effectRef idx="0">
+            <a:schemeClr val="accent1"/>
+          </a:effectRef>
+          <a:fontRef idx="minor">
+            <a:schemeClr val="lt1"/>
+          </a:fontRef>
+        </p:style>
+        <p:txBody>
+          <a:bodyPr lIns="0" rIns="0" rtlCol="0" anchor="ctr"/>
+          <a:lstStyle/>
+          <a:p>
+            <a:pPr algn="ctr"/>
+            <a:r>
+              <a:rPr lang="en-US" altLang="ko-KR" sz="1200" dirty="0" smtClean="0">
+                <a:solidFill>
+                  <a:schemeClr val="tx1"/>
+                </a:solidFill>
+                <a:latin typeface="Times New Roman" panose="02020603050405020304" pitchFamily="18" charset="0"/>
+                <a:cs typeface="Times New Roman" panose="02020603050405020304" pitchFamily="18" charset="0"/>
+              </a:rPr>
+              <a:t>Mapping Policy</a:t>
+            </a:r>
+            <a:endParaRPr lang="ko-KR" altLang="en-US" sz="1200" dirty="0">
+              <a:solidFill>
+                <a:schemeClr val="tx1"/>
+              </a:solidFill>
+              <a:latin typeface="Times New Roman" panose="02020603050405020304" pitchFamily="18" charset="0"/>
+              <a:cs typeface="Times New Roman" panose="02020603050405020304" pitchFamily="18" charset="0"/>
+            </a:endParaRPr>
+          </a:p>
+        </p:txBody>
+      </p:sp>
+      <p:cxnSp>
+        <p:nvCxnSpPr>
+          <p:cNvPr id="55" name="직선 연결선 54"/>
+          <p:cNvCxnSpPr/>
+          <p:nvPr/>
+        </p:nvCxnSpPr>
+        <p:spPr>
+          <a:xfrm>
+            <a:off x="1432156" y="4599305"/>
+            <a:ext cx="4549543" cy="0"/>
+          </a:xfrm>
+          <a:prstGeom prst="line">
+            <a:avLst/>
+          </a:prstGeom>
+          <a:ln w="25400">
+            <a:solidFill>
+              <a:schemeClr val="tx1"/>
+            </a:solidFill>
+          </a:ln>
+        </p:spPr>
+        <p:style>
+          <a:lnRef idx="1">
+            <a:schemeClr val="accent1"/>
+          </a:lnRef>
+          <a:fillRef idx="0">
+            <a:schemeClr val="accent1"/>
+          </a:fillRef>
+          <a:effectRef idx="0">
+            <a:schemeClr val="accent1"/>
+          </a:effectRef>
+          <a:fontRef idx="minor">
+            <a:schemeClr val="tx1"/>
+          </a:fontRef>
+        </p:style>
+      </p:cxnSp>
+      <p:sp>
+        <p:nvSpPr>
+          <p:cNvPr id="56" name="모서리가 둥근 직사각형 55"/>
+          <p:cNvSpPr/>
+          <p:nvPr/>
+        </p:nvSpPr>
+        <p:spPr>
+          <a:xfrm>
+            <a:off x="3451501" y="3022608"/>
+            <a:ext cx="1103630" cy="236571"/>
+          </a:xfrm>
+          <a:prstGeom prst="roundRect">
+            <a:avLst/>
+          </a:prstGeom>
+          <a:solidFill>
+            <a:schemeClr val="bg1">
+              <a:lumMod val="85000"/>
+            </a:schemeClr>
+          </a:solidFill>
+          <a:ln>
+            <a:solidFill>
+              <a:schemeClr val="tx1"/>
+            </a:solidFill>
+          </a:ln>
+        </p:spPr>
+        <p:style>
+          <a:lnRef idx="2">
+            <a:schemeClr val="accent1">
+              <a:shade val="50000"/>
+            </a:schemeClr>
+          </a:lnRef>
+          <a:fillRef idx="1">
+            <a:schemeClr val="accent1"/>
+          </a:fillRef>
+          <a:effectRef idx="0">
+            <a:schemeClr val="accent1"/>
+          </a:effectRef>
+          <a:fontRef idx="minor">
+            <a:schemeClr val="lt1"/>
+          </a:fontRef>
+        </p:style>
+        <p:txBody>
+          <a:bodyPr rtlCol="0" anchor="ctr"/>
+          <a:lstStyle/>
+          <a:p>
+            <a:pPr algn="ctr"/>
+            <a:r>
+              <a:rPr lang="en-US" altLang="ko-KR" sz="1200" dirty="0" smtClean="0">
+                <a:solidFill>
+                  <a:schemeClr val="tx1"/>
+                </a:solidFill>
+                <a:latin typeface="Times New Roman" panose="02020603050405020304" pitchFamily="18" charset="0"/>
+                <a:cs typeface="Times New Roman" panose="02020603050405020304" pitchFamily="18" charset="0"/>
+              </a:rPr>
+              <a:t>PC Clustering</a:t>
+            </a:r>
+            <a:endParaRPr lang="ko-KR" altLang="en-US" sz="1200" dirty="0">
+              <a:solidFill>
+                <a:schemeClr val="tx1"/>
+              </a:solidFill>
+              <a:latin typeface="Times New Roman" panose="02020603050405020304" pitchFamily="18" charset="0"/>
+              <a:cs typeface="Times New Roman" panose="02020603050405020304" pitchFamily="18" charset="0"/>
+            </a:endParaRPr>
+          </a:p>
+        </p:txBody>
+      </p:sp>
+      <p:cxnSp>
+        <p:nvCxnSpPr>
+          <p:cNvPr id="58" name="꺾인 연결선 57"/>
+          <p:cNvCxnSpPr/>
+          <p:nvPr/>
+        </p:nvCxnSpPr>
+        <p:spPr>
+          <a:xfrm rot="5400000" flipH="1" flipV="1">
+            <a:off x="2091444" y="3977975"/>
+            <a:ext cx="692784" cy="556862"/>
+          </a:xfrm>
+          <a:prstGeom prst="bentConnector2">
+            <a:avLst/>
+          </a:prstGeom>
+          <a:ln w="19050">
+            <a:solidFill>
+              <a:schemeClr val="tx1"/>
+            </a:solidFill>
+            <a:prstDash val="dash"/>
+            <a:tailEnd type="triangle" w="lg" len="med"/>
+          </a:ln>
+        </p:spPr>
+        <p:style>
+          <a:lnRef idx="1">
+            <a:schemeClr val="accent1"/>
+          </a:lnRef>
+          <a:fillRef idx="0">
+            <a:schemeClr val="accent1"/>
+          </a:fillRef>
+          <a:effectRef idx="0">
+            <a:schemeClr val="accent1"/>
+          </a:effectRef>
+          <a:fontRef idx="minor">
+            <a:schemeClr val="tx1"/>
+          </a:fontRef>
+        </p:style>
+      </p:cxnSp>
+      <p:sp>
+        <p:nvSpPr>
+          <p:cNvPr id="60" name="TextBox 59"/>
+          <p:cNvSpPr txBox="1"/>
+          <p:nvPr/>
+        </p:nvSpPr>
+        <p:spPr>
+          <a:xfrm>
+            <a:off x="1874069" y="3486400"/>
+            <a:ext cx="894797" cy="461665"/>
+          </a:xfrm>
+          <a:prstGeom prst="rect">
+            <a:avLst/>
+          </a:prstGeom>
+          <a:noFill/>
+        </p:spPr>
+        <p:txBody>
+          <a:bodyPr wrap="none" rtlCol="0">
+            <a:spAutoFit/>
+          </a:bodyPr>
+          <a:lstStyle/>
+          <a:p>
+            <a:r>
+              <a:rPr lang="en-US" altLang="ko-KR" sz="1200" dirty="0" smtClean="0">
+                <a:latin typeface="Times New Roman" panose="02020603050405020304" pitchFamily="18" charset="0"/>
+                <a:cs typeface="Times New Roman" panose="02020603050405020304" pitchFamily="18" charset="0"/>
+              </a:rPr>
+              <a:t>Number of </a:t>
+            </a:r>
+          </a:p>
+          <a:p>
+            <a:r>
+              <a:rPr lang="en-US" altLang="ko-KR" sz="1200" dirty="0" smtClean="0">
+                <a:latin typeface="Times New Roman" panose="02020603050405020304" pitchFamily="18" charset="0"/>
+                <a:cs typeface="Times New Roman" panose="02020603050405020304" pitchFamily="18" charset="0"/>
+              </a:rPr>
+              <a:t>Streams</a:t>
+            </a:r>
+            <a:endParaRPr lang="ko-KR" altLang="en-US" sz="1200" dirty="0">
+              <a:latin typeface="Times New Roman" panose="02020603050405020304" pitchFamily="18" charset="0"/>
+              <a:cs typeface="Times New Roman" panose="02020603050405020304" pitchFamily="18" charset="0"/>
+            </a:endParaRPr>
+          </a:p>
+        </p:txBody>
+      </p:sp>
+      <p:sp>
+        <p:nvSpPr>
+          <p:cNvPr id="61" name="TextBox 60"/>
+          <p:cNvSpPr txBox="1"/>
+          <p:nvPr/>
+        </p:nvSpPr>
+        <p:spPr>
+          <a:xfrm>
+            <a:off x="1453368" y="4562716"/>
+            <a:ext cx="1807995" cy="338554"/>
+          </a:xfrm>
+          <a:prstGeom prst="rect">
+            <a:avLst/>
+          </a:prstGeom>
+          <a:noFill/>
+        </p:spPr>
+        <p:txBody>
+          <a:bodyPr wrap="none" rtlCol="0">
+            <a:spAutoFit/>
+          </a:bodyPr>
+          <a:lstStyle/>
+          <a:p>
+            <a:r>
+              <a:rPr lang="en-US" altLang="ko-KR" sz="1600" b="1" dirty="0" smtClean="0">
+                <a:latin typeface="Times New Roman" panose="02020603050405020304" pitchFamily="18" charset="0"/>
+                <a:cs typeface="Times New Roman" panose="02020603050405020304" pitchFamily="18" charset="0"/>
+              </a:rPr>
+              <a:t>Multi-Stream SSD</a:t>
+            </a:r>
+          </a:p>
+        </p:txBody>
+      </p:sp>
+      <p:cxnSp>
+        <p:nvCxnSpPr>
+          <p:cNvPr id="63" name="직선 화살표 연결선 62"/>
+          <p:cNvCxnSpPr>
+            <a:stCxn id="44" idx="2"/>
+          </p:cNvCxnSpPr>
+          <p:nvPr/>
+        </p:nvCxnSpPr>
+        <p:spPr>
+          <a:xfrm flipH="1">
+            <a:off x="4026694" y="4257676"/>
+            <a:ext cx="1111" cy="338137"/>
+          </a:xfrm>
+          <a:prstGeom prst="straightConnector1">
+            <a:avLst/>
+          </a:prstGeom>
+          <a:ln w="19050">
+            <a:solidFill>
+              <a:schemeClr val="tx1"/>
+            </a:solidFill>
+            <a:prstDash val="sysDash"/>
+            <a:tailEnd type="triangle" w="lg" len="med"/>
+          </a:ln>
+        </p:spPr>
+        <p:style>
+          <a:lnRef idx="1">
+            <a:schemeClr val="accent1"/>
+          </a:lnRef>
+          <a:fillRef idx="0">
+            <a:schemeClr val="accent1"/>
+          </a:fillRef>
+          <a:effectRef idx="0">
+            <a:schemeClr val="accent1"/>
+          </a:effectRef>
+          <a:fontRef idx="minor">
+            <a:schemeClr val="tx1"/>
+          </a:fontRef>
+        </p:style>
+      </p:cxnSp>
+      <p:sp>
+        <p:nvSpPr>
+          <p:cNvPr id="69" name="TextBox 68"/>
+          <p:cNvSpPr txBox="1"/>
+          <p:nvPr/>
+        </p:nvSpPr>
+        <p:spPr>
+          <a:xfrm>
+            <a:off x="4030804" y="4292673"/>
+            <a:ext cx="2634247" cy="307777"/>
+          </a:xfrm>
+          <a:prstGeom prst="rect">
+            <a:avLst/>
+          </a:prstGeom>
+          <a:noFill/>
+        </p:spPr>
+        <p:txBody>
+          <a:bodyPr wrap="none" rtlCol="0">
+            <a:spAutoFit/>
+          </a:bodyPr>
+          <a:lstStyle/>
+          <a:p>
+            <a:r>
+              <a:rPr lang="en-US" altLang="ko-KR" sz="1200" dirty="0" smtClean="0">
+                <a:latin typeface="Times New Roman" panose="02020603050405020304" pitchFamily="18" charset="0"/>
+                <a:cs typeface="Times New Roman" panose="02020603050405020304" pitchFamily="18" charset="0"/>
+              </a:rPr>
+              <a:t>Write </a:t>
+            </a:r>
+            <a:r>
+              <a:rPr lang="en-US" altLang="ko-KR" sz="1200" dirty="0" err="1" smtClean="0">
+                <a:latin typeface="Times New Roman" panose="02020603050405020304" pitchFamily="18" charset="0"/>
+                <a:cs typeface="Times New Roman" panose="02020603050405020304" pitchFamily="18" charset="0"/>
+              </a:rPr>
+              <a:t>Req</a:t>
+            </a:r>
+            <a:r>
+              <a:rPr lang="en-US" altLang="ko-KR" sz="1200" dirty="0" smtClean="0">
+                <a:latin typeface="Times New Roman" panose="02020603050405020304" pitchFamily="18" charset="0"/>
+                <a:cs typeface="Times New Roman" panose="02020603050405020304" pitchFamily="18" charset="0"/>
+              </a:rPr>
+              <a:t>(</a:t>
+            </a:r>
+            <a:r>
+              <a:rPr lang="en-US" altLang="ko-KR" sz="1400" b="1" dirty="0" err="1" smtClean="0">
+                <a:latin typeface="Times New Roman" panose="02020603050405020304" pitchFamily="18" charset="0"/>
+                <a:cs typeface="Times New Roman" panose="02020603050405020304" pitchFamily="18" charset="0"/>
+              </a:rPr>
+              <a:t>StreamID</a:t>
+            </a:r>
+            <a:r>
+              <a:rPr lang="en-US" altLang="ko-KR" sz="1200" b="1" dirty="0" smtClean="0">
+                <a:latin typeface="Times New Roman" panose="02020603050405020304" pitchFamily="18" charset="0"/>
+                <a:cs typeface="Times New Roman" panose="02020603050405020304" pitchFamily="18" charset="0"/>
+              </a:rPr>
+              <a:t>, </a:t>
+            </a:r>
+            <a:r>
+              <a:rPr lang="en-US" altLang="ko-KR" sz="1200" dirty="0" smtClean="0">
+                <a:latin typeface="Times New Roman" panose="02020603050405020304" pitchFamily="18" charset="0"/>
+                <a:cs typeface="Times New Roman" panose="02020603050405020304" pitchFamily="18" charset="0"/>
+              </a:rPr>
+              <a:t>LBA, Size, …)</a:t>
             </a:r>
             <a:endParaRPr lang="ko-KR" altLang="en-US" sz="1200" b="1" dirty="0">
               <a:latin typeface="Times New Roman" panose="02020603050405020304" pitchFamily="18" charset="0"/>

</xml_diff>